<commit_message>
Updated README and power point deck
</commit_message>
<xml_diff>
--- a/resources/Lake_House_Foundations_Solution_Slide.pptx
+++ b/resources/Lake_House_Foundations_Solution_Slide.pptx
@@ -5,12 +5,13 @@
     <p:sldMasterId id="2147483660" r:id="rId1"/>
   </p:sldMasterIdLst>
   <p:notesMasterIdLst>
-    <p:notesMasterId r:id="rId5"/>
+    <p:notesMasterId r:id="rId6"/>
   </p:notesMasterIdLst>
   <p:sldIdLst>
-    <p:sldId id="266" r:id="rId2"/>
-    <p:sldId id="263" r:id="rId3"/>
-    <p:sldId id="267" r:id="rId4"/>
+    <p:sldId id="267" r:id="rId2"/>
+    <p:sldId id="268" r:id="rId3"/>
+    <p:sldId id="263" r:id="rId4"/>
+    <p:sldId id="269" r:id="rId5"/>
   </p:sldIdLst>
   <p:sldSz cx="12192000" cy="6858000"/>
   <p:notesSz cx="6858000" cy="9144000"/>
@@ -109,6 +110,11 @@
       </a:defRPr>
     </a:lvl9pPr>
   </p:defaultTextStyle>
+  <p:extLst>
+    <p:ext uri="{EFAFB233-063F-42B5-8137-9DF3F51BA10A}">
+      <p15:sldGuideLst xmlns:p15="http://schemas.microsoft.com/office/powerpoint/2012/main"/>
+    </p:ext>
+  </p:extLst>
 </p:presentation>
 </file>
 
@@ -194,7 +200,7 @@
           <a:p>
             <a:fld id="{0D686AD2-EFC8-444A-9833-53754FE7F0F2}" type="datetimeFigureOut">
               <a:rPr lang="en-US" smtClean="0"/>
-              <a:t>11/10/2021</a:t>
+              <a:t>11/19/2021</a:t>
             </a:fld>
             <a:endParaRPr lang="en-US"/>
           </a:p>
@@ -635,7 +641,6 @@
                 <a:uLnTx/>
                 <a:uFillTx/>
                 <a:latin typeface="Arial"/>
-                <a:ea typeface="+mn-ea"/>
                 <a:cs typeface="Arial"/>
                 <a:sym typeface="Arial"/>
               </a:rPr>
@@ -671,7 +676,6 @@
               <a:uLnTx/>
               <a:uFillTx/>
               <a:latin typeface="Arial"/>
-              <a:ea typeface="+mn-ea"/>
               <a:cs typeface="Arial"/>
               <a:sym typeface="Arial"/>
             </a:endParaRPr>
@@ -679,6 +683,11 @@
         </p:txBody>
       </p:sp>
     </p:spTree>
+    <p:extLst>
+      <p:ext uri="{BB962C8B-B14F-4D97-AF65-F5344CB8AC3E}">
+        <p14:creationId xmlns:p14="http://schemas.microsoft.com/office/powerpoint/2010/main" val="3111789297"/>
+      </p:ext>
+    </p:extLst>
   </p:cSld>
   <p:clrMapOvr>
     <a:masterClrMapping/>
@@ -860,7 +869,6 @@
                 <a:uLnTx/>
                 <a:uFillTx/>
                 <a:latin typeface="Arial"/>
-                <a:ea typeface="+mn-ea"/>
                 <a:cs typeface="Arial"/>
                 <a:sym typeface="Arial"/>
               </a:rPr>
@@ -883,7 +891,7 @@
                 <a:tabLst/>
                 <a:defRPr/>
               </a:pPr>
-              <a:t>3</a:t>
+              <a:t>2</a:t>
             </a:fld>
             <a:endParaRPr kumimoji="0" sz="1400" b="0" i="0" u="none" strike="noStrike" kern="0" cap="none" spc="0" normalizeH="0" baseline="0" noProof="0">
               <a:ln>
@@ -896,7 +904,6 @@
               <a:uLnTx/>
               <a:uFillTx/>
               <a:latin typeface="Arial"/>
-              <a:ea typeface="+mn-ea"/>
               <a:cs typeface="Arial"/>
               <a:sym typeface="Arial"/>
             </a:endParaRPr>
@@ -906,7 +913,7 @@
     </p:spTree>
     <p:extLst>
       <p:ext uri="{BB962C8B-B14F-4D97-AF65-F5344CB8AC3E}">
-        <p14:creationId xmlns:p14="http://schemas.microsoft.com/office/powerpoint/2010/main" val="3924946857"/>
+        <p14:creationId xmlns:p14="http://schemas.microsoft.com/office/powerpoint/2010/main" val="718884388"/>
       </p:ext>
     </p:extLst>
   </p:cSld>
@@ -6384,7 +6391,7 @@
             </a:pPr>
             <a:r>
               <a:rPr lang="en-US" b="1" dirty="0"/>
-              <a:t>Lake House Solution</a:t>
+              <a:t>Lake House Reference Architecture</a:t>
             </a:r>
             <a:endParaRPr b="1" dirty="0"/>
           </a:p>
@@ -6411,8 +6418,8 @@
         </p:blipFill>
         <p:spPr>
           <a:xfrm>
-            <a:off x="152453" y="2159748"/>
-            <a:ext cx="11891194" cy="3849165"/>
+            <a:off x="340466" y="1268828"/>
+            <a:ext cx="11561539" cy="3742456"/>
           </a:xfrm>
           <a:prstGeom prst="rect">
             <a:avLst/>
@@ -6420,6 +6427,11 @@
         </p:spPr>
       </p:pic>
     </p:spTree>
+    <p:extLst>
+      <p:ext uri="{BB962C8B-B14F-4D97-AF65-F5344CB8AC3E}">
+        <p14:creationId xmlns:p14="http://schemas.microsoft.com/office/powerpoint/2010/main" val="3265285709"/>
+      </p:ext>
+    </p:extLst>
   </p:cSld>
   <p:clrMapOvr>
     <a:masterClrMapping/>
@@ -6428,6 +6440,315 @@
 </file>
 
 <file path=ppt/slides/slide2.xml><?xml version="1.0" encoding="utf-8"?>
+<p:sld xmlns:a="http://schemas.openxmlformats.org/drawingml/2006/main" xmlns:r="http://schemas.openxmlformats.org/officeDocument/2006/relationships" xmlns:p="http://schemas.openxmlformats.org/presentationml/2006/main">
+  <p:cSld>
+    <p:spTree>
+      <p:nvGrpSpPr>
+        <p:cNvPr id="1" name="Shape 46"/>
+        <p:cNvGrpSpPr/>
+        <p:nvPr/>
+      </p:nvGrpSpPr>
+      <p:grpSpPr>
+        <a:xfrm>
+          <a:off x="0" y="0"/>
+          <a:ext cx="0" cy="0"/>
+          <a:chOff x="0" y="0"/>
+          <a:chExt cx="0" cy="0"/>
+        </a:xfrm>
+      </p:grpSpPr>
+      <p:sp>
+        <p:nvSpPr>
+          <p:cNvPr id="47" name="Google Shape;47;p7"/>
+          <p:cNvSpPr txBox="1">
+            <a:spLocks noGrp="1"/>
+          </p:cNvSpPr>
+          <p:nvPr>
+            <p:ph type="title"/>
+          </p:nvPr>
+        </p:nvSpPr>
+        <p:spPr>
+          <a:xfrm>
+            <a:off x="91447" y="304803"/>
+            <a:ext cx="11948100" cy="496200"/>
+          </a:xfrm>
+          <a:prstGeom prst="rect">
+            <a:avLst/>
+          </a:prstGeom>
+          <a:noFill/>
+          <a:ln>
+            <a:noFill/>
+          </a:ln>
+        </p:spPr>
+        <p:txBody>
+          <a:bodyPr spcFirstLastPara="1" wrap="square" lIns="91425" tIns="45700" rIns="91425" bIns="45700" anchor="b" anchorCtr="0">
+            <a:noAutofit/>
+          </a:bodyPr>
+          <a:lstStyle/>
+          <a:p>
+            <a:pPr marL="0" lvl="0" indent="0" algn="l" rtl="0">
+              <a:lnSpc>
+                <a:spcPct val="100000"/>
+              </a:lnSpc>
+              <a:spcBef>
+                <a:spcPts val="0"/>
+              </a:spcBef>
+              <a:spcAft>
+                <a:spcPts val="0"/>
+              </a:spcAft>
+              <a:buClr>
+                <a:schemeClr val="dk1"/>
+              </a:buClr>
+              <a:buSzPts val="2400"/>
+              <a:buFont typeface="Corbel"/>
+              <a:buNone/>
+            </a:pPr>
+            <a:r>
+              <a:rPr lang="en-US" b="1" dirty="0"/>
+              <a:t>Multi-Account Step-Function Orchestration of Glue Workflows</a:t>
+            </a:r>
+            <a:endParaRPr b="1" dirty="0"/>
+          </a:p>
+        </p:txBody>
+      </p:sp>
+      <p:pic>
+        <p:nvPicPr>
+          <p:cNvPr id="8" name="Picture 7">
+            <a:extLst>
+              <a:ext uri="{FF2B5EF4-FFF2-40B4-BE49-F238E27FC236}">
+                <a16:creationId xmlns:a16="http://schemas.microsoft.com/office/drawing/2014/main" id="{4104A92A-C4DC-4273-9270-47660A6FBF9F}"/>
+              </a:ext>
+            </a:extLst>
+          </p:cNvPr>
+          <p:cNvPicPr>
+            <a:picLocks noChangeAspect="1"/>
+          </p:cNvPicPr>
+          <p:nvPr/>
+        </p:nvPicPr>
+        <p:blipFill>
+          <a:blip r:embed="rId3"/>
+          <a:stretch>
+            <a:fillRect/>
+          </a:stretch>
+        </p:blipFill>
+        <p:spPr>
+          <a:xfrm>
+            <a:off x="1519236" y="921596"/>
+            <a:ext cx="4576764" cy="5139900"/>
+          </a:xfrm>
+          <a:prstGeom prst="rect">
+            <a:avLst/>
+          </a:prstGeom>
+        </p:spPr>
+      </p:pic>
+      <p:pic>
+        <p:nvPicPr>
+          <p:cNvPr id="10" name="Picture 9">
+            <a:extLst>
+              <a:ext uri="{FF2B5EF4-FFF2-40B4-BE49-F238E27FC236}">
+                <a16:creationId xmlns:a16="http://schemas.microsoft.com/office/drawing/2014/main" id="{72954FDF-BCA4-43EC-B21D-F2FCDD0900FA}"/>
+              </a:ext>
+            </a:extLst>
+          </p:cNvPr>
+          <p:cNvPicPr>
+            <a:picLocks noChangeAspect="1"/>
+          </p:cNvPicPr>
+          <p:nvPr/>
+        </p:nvPicPr>
+        <p:blipFill>
+          <a:blip r:embed="rId4"/>
+          <a:stretch>
+            <a:fillRect/>
+          </a:stretch>
+        </p:blipFill>
+        <p:spPr>
+          <a:xfrm>
+            <a:off x="3380551" y="1344719"/>
+            <a:ext cx="3468202" cy="747960"/>
+          </a:xfrm>
+          <a:prstGeom prst="rect">
+            <a:avLst/>
+          </a:prstGeom>
+        </p:spPr>
+      </p:pic>
+      <p:pic>
+        <p:nvPicPr>
+          <p:cNvPr id="12" name="Picture 11">
+            <a:extLst>
+              <a:ext uri="{FF2B5EF4-FFF2-40B4-BE49-F238E27FC236}">
+                <a16:creationId xmlns:a16="http://schemas.microsoft.com/office/drawing/2014/main" id="{76053BD2-411D-46AB-A587-0EB54B069686}"/>
+              </a:ext>
+            </a:extLst>
+          </p:cNvPr>
+          <p:cNvPicPr>
+            <a:picLocks noChangeAspect="1"/>
+          </p:cNvPicPr>
+          <p:nvPr/>
+        </p:nvPicPr>
+        <p:blipFill>
+          <a:blip r:embed="rId5"/>
+          <a:stretch>
+            <a:fillRect/>
+          </a:stretch>
+        </p:blipFill>
+        <p:spPr>
+          <a:xfrm>
+            <a:off x="5680296" y="3411394"/>
+            <a:ext cx="1584162" cy="734558"/>
+          </a:xfrm>
+          <a:prstGeom prst="rect">
+            <a:avLst/>
+          </a:prstGeom>
+        </p:spPr>
+      </p:pic>
+      <p:pic>
+        <p:nvPicPr>
+          <p:cNvPr id="14" name="Picture 13">
+            <a:extLst>
+              <a:ext uri="{FF2B5EF4-FFF2-40B4-BE49-F238E27FC236}">
+                <a16:creationId xmlns:a16="http://schemas.microsoft.com/office/drawing/2014/main" id="{6AA97F58-D370-4587-A45F-160E8EA03EFD}"/>
+              </a:ext>
+            </a:extLst>
+          </p:cNvPr>
+          <p:cNvPicPr>
+            <a:picLocks noChangeAspect="1"/>
+          </p:cNvPicPr>
+          <p:nvPr/>
+        </p:nvPicPr>
+        <p:blipFill>
+          <a:blip r:embed="rId6"/>
+          <a:stretch>
+            <a:fillRect/>
+          </a:stretch>
+        </p:blipFill>
+        <p:spPr>
+          <a:xfrm>
+            <a:off x="4135624" y="2260481"/>
+            <a:ext cx="3859746" cy="870418"/>
+          </a:xfrm>
+          <a:prstGeom prst="rect">
+            <a:avLst/>
+          </a:prstGeom>
+        </p:spPr>
+      </p:pic>
+      <p:sp>
+        <p:nvSpPr>
+          <p:cNvPr id="3" name="TextBox 2">
+            <a:extLst>
+              <a:ext uri="{FF2B5EF4-FFF2-40B4-BE49-F238E27FC236}">
+                <a16:creationId xmlns:a16="http://schemas.microsoft.com/office/drawing/2014/main" id="{968D1DE1-4C1C-46C7-BCC2-14BA77A30101}"/>
+              </a:ext>
+            </a:extLst>
+          </p:cNvPr>
+          <p:cNvSpPr txBox="1"/>
+          <p:nvPr/>
+        </p:nvSpPr>
+        <p:spPr>
+          <a:xfrm>
+            <a:off x="6899843" y="1504943"/>
+            <a:ext cx="3299636" cy="307777"/>
+          </a:xfrm>
+          <a:prstGeom prst="rect">
+            <a:avLst/>
+          </a:prstGeom>
+          <a:noFill/>
+        </p:spPr>
+        <p:txBody>
+          <a:bodyPr wrap="square" rtlCol="0">
+            <a:spAutoFit/>
+          </a:bodyPr>
+          <a:lstStyle/>
+          <a:p>
+            <a:r>
+              <a:rPr lang="en-US" sz="1400" dirty="0"/>
+              <a:t>Landing Zone Account Workflow</a:t>
+            </a:r>
+          </a:p>
+        </p:txBody>
+      </p:sp>
+      <p:sp>
+        <p:nvSpPr>
+          <p:cNvPr id="26" name="TextBox 25">
+            <a:extLst>
+              <a:ext uri="{FF2B5EF4-FFF2-40B4-BE49-F238E27FC236}">
+                <a16:creationId xmlns:a16="http://schemas.microsoft.com/office/drawing/2014/main" id="{690004F1-69B9-4513-BC63-09925D369466}"/>
+              </a:ext>
+            </a:extLst>
+          </p:cNvPr>
+          <p:cNvSpPr txBox="1"/>
+          <p:nvPr/>
+        </p:nvSpPr>
+        <p:spPr>
+          <a:xfrm>
+            <a:off x="8172076" y="2493362"/>
+            <a:ext cx="3147282" cy="307777"/>
+          </a:xfrm>
+          <a:prstGeom prst="rect">
+            <a:avLst/>
+          </a:prstGeom>
+          <a:noFill/>
+        </p:spPr>
+        <p:txBody>
+          <a:bodyPr wrap="square" rtlCol="0">
+            <a:spAutoFit/>
+          </a:bodyPr>
+          <a:lstStyle/>
+          <a:p>
+            <a:r>
+              <a:rPr lang="en-US" sz="1400" dirty="0"/>
+              <a:t>Lake House Account Workflow</a:t>
+            </a:r>
+          </a:p>
+        </p:txBody>
+      </p:sp>
+      <p:sp>
+        <p:nvSpPr>
+          <p:cNvPr id="27" name="TextBox 26">
+            <a:extLst>
+              <a:ext uri="{FF2B5EF4-FFF2-40B4-BE49-F238E27FC236}">
+                <a16:creationId xmlns:a16="http://schemas.microsoft.com/office/drawing/2014/main" id="{E00FAF4A-4414-4E27-8946-E97F5725B8C0}"/>
+              </a:ext>
+            </a:extLst>
+          </p:cNvPr>
+          <p:cNvSpPr txBox="1"/>
+          <p:nvPr/>
+        </p:nvSpPr>
+        <p:spPr>
+          <a:xfrm>
+            <a:off x="7386805" y="3564917"/>
+            <a:ext cx="3147282" cy="307777"/>
+          </a:xfrm>
+          <a:prstGeom prst="rect">
+            <a:avLst/>
+          </a:prstGeom>
+          <a:noFill/>
+        </p:spPr>
+        <p:txBody>
+          <a:bodyPr wrap="square" rtlCol="0">
+            <a:spAutoFit/>
+          </a:bodyPr>
+          <a:lstStyle/>
+          <a:p>
+            <a:r>
+              <a:rPr lang="en-US" sz="1400" dirty="0"/>
+              <a:t>Governance Account Workflow</a:t>
+            </a:r>
+          </a:p>
+        </p:txBody>
+      </p:sp>
+    </p:spTree>
+    <p:extLst>
+      <p:ext uri="{BB962C8B-B14F-4D97-AF65-F5344CB8AC3E}">
+        <p14:creationId xmlns:p14="http://schemas.microsoft.com/office/powerpoint/2010/main" val="1462342310"/>
+      </p:ext>
+    </p:extLst>
+  </p:cSld>
+  <p:clrMapOvr>
+    <a:masterClrMapping/>
+  </p:clrMapOvr>
+</p:sld>
+</file>
+
+<file path=ppt/slides/slide3.xml><?xml version="1.0" encoding="utf-8"?>
 <p:sld xmlns:a="http://schemas.openxmlformats.org/drawingml/2006/main" xmlns:r="http://schemas.openxmlformats.org/officeDocument/2006/relationships" xmlns:p="http://schemas.openxmlformats.org/presentationml/2006/main">
   <p:cSld>
     <p:spTree>
@@ -6467,7 +6788,7 @@
           <a:p>
             <a:r>
               <a:rPr lang="en-US" dirty="0"/>
-              <a:t>Data Mesh Architectures</a:t>
+              <a:t>The Data Mesh Concept</a:t>
             </a:r>
           </a:p>
         </p:txBody>
@@ -6521,12 +6842,12 @@
 </p:sld>
 </file>
 
-<file path=ppt/slides/slide3.xml><?xml version="1.0" encoding="utf-8"?>
+<file path=ppt/slides/slide4.xml><?xml version="1.0" encoding="utf-8"?>
 <p:sld xmlns:a="http://schemas.openxmlformats.org/drawingml/2006/main" xmlns:r="http://schemas.openxmlformats.org/officeDocument/2006/relationships" xmlns:p="http://schemas.openxmlformats.org/presentationml/2006/main">
   <p:cSld>
     <p:spTree>
       <p:nvGrpSpPr>
-        <p:cNvPr id="1" name="Shape 46"/>
+        <p:cNvPr id="1" name=""/>
         <p:cNvGrpSpPr/>
         <p:nvPr/>
       </p:nvGrpSpPr>
@@ -6538,66 +6859,48 @@
           <a:chExt cx="0" cy="0"/>
         </a:xfrm>
       </p:grpSpPr>
-      <p:sp>
-        <p:nvSpPr>
-          <p:cNvPr id="47" name="Google Shape;47;p7"/>
-          <p:cNvSpPr txBox="1">
-            <a:spLocks noGrp="1"/>
-          </p:cNvSpPr>
-          <p:nvPr>
-            <p:ph type="title"/>
-          </p:nvPr>
-        </p:nvSpPr>
+      <p:pic>
+        <p:nvPicPr>
+          <p:cNvPr id="5" name="Picture 4" descr="Graphical user interface&#10;&#10;Description automatically generated">
+            <a:extLst>
+              <a:ext uri="{FF2B5EF4-FFF2-40B4-BE49-F238E27FC236}">
+                <a16:creationId xmlns:a16="http://schemas.microsoft.com/office/drawing/2014/main" id="{B1F47F22-3795-4668-B948-08ABAC592775}"/>
+              </a:ext>
+            </a:extLst>
+          </p:cNvPr>
+          <p:cNvPicPr>
+            <a:picLocks noChangeAspect="1"/>
+          </p:cNvPicPr>
+          <p:nvPr/>
+        </p:nvPicPr>
+        <p:blipFill>
+          <a:blip r:embed="rId2">
+            <a:extLst>
+              <a:ext uri="{28A0092B-C50C-407E-A947-70E740481C1C}">
+                <a14:useLocalDpi xmlns:a14="http://schemas.microsoft.com/office/drawing/2010/main" val="0"/>
+              </a:ext>
+            </a:extLst>
+          </a:blip>
+          <a:stretch>
+            <a:fillRect/>
+          </a:stretch>
+        </p:blipFill>
         <p:spPr>
           <a:xfrm>
-            <a:off x="91447" y="304803"/>
-            <a:ext cx="11948100" cy="496200"/>
+            <a:off x="159042" y="284497"/>
+            <a:ext cx="6948989" cy="5826539"/>
           </a:xfrm>
           <a:prstGeom prst="rect">
             <a:avLst/>
           </a:prstGeom>
-          <a:noFill/>
-          <a:ln>
-            <a:noFill/>
-          </a:ln>
         </p:spPr>
-        <p:txBody>
-          <a:bodyPr spcFirstLastPara="1" wrap="square" lIns="91425" tIns="45700" rIns="91425" bIns="45700" anchor="b" anchorCtr="0">
-            <a:noAutofit/>
-          </a:bodyPr>
-          <a:lstStyle/>
-          <a:p>
-            <a:pPr marL="0" lvl="0" indent="0" algn="l" rtl="0">
-              <a:lnSpc>
-                <a:spcPct val="100000"/>
-              </a:lnSpc>
-              <a:spcBef>
-                <a:spcPts val="0"/>
-              </a:spcBef>
-              <a:spcAft>
-                <a:spcPts val="0"/>
-              </a:spcAft>
-              <a:buClr>
-                <a:schemeClr val="dk1"/>
-              </a:buClr>
-              <a:buSzPts val="2400"/>
-              <a:buFont typeface="Corbel"/>
-              <a:buNone/>
-            </a:pPr>
-            <a:r>
-              <a:rPr lang="en-US" b="1" dirty="0"/>
-              <a:t>Lake House Solution</a:t>
-            </a:r>
-            <a:endParaRPr b="1" dirty="0"/>
-          </a:p>
-        </p:txBody>
-      </p:sp>
+      </p:pic>
       <p:grpSp>
         <p:nvGrpSpPr>
           <p:cNvPr id="6" name="Group 5">
             <a:extLst>
               <a:ext uri="{FF2B5EF4-FFF2-40B4-BE49-F238E27FC236}">
-                <a16:creationId xmlns:a16="http://schemas.microsoft.com/office/drawing/2014/main" id="{FE653611-EF2E-455F-B4EA-1E7DC45AD18C}"/>
+                <a16:creationId xmlns:a16="http://schemas.microsoft.com/office/drawing/2014/main" id="{40351608-D022-4F20-8E28-418E549C6A4A}"/>
               </a:ext>
             </a:extLst>
           </p:cNvPr>
@@ -6606,7 +6909,7 @@
         </p:nvGrpSpPr>
         <p:grpSpPr>
           <a:xfrm>
-            <a:off x="404313" y="3375713"/>
+            <a:off x="7214187" y="438820"/>
             <a:ext cx="4496756" cy="2774724"/>
             <a:chOff x="590413" y="1154337"/>
             <a:chExt cx="4994955" cy="2774724"/>
@@ -6614,7 +6917,13 @@
         </p:grpSpPr>
         <p:pic>
           <p:nvPicPr>
-            <p:cNvPr id="48" name="Google Shape;48;p7"/>
+            <p:cNvPr id="7" name="Google Shape;48;p7">
+              <a:extLst>
+                <a:ext uri="{FF2B5EF4-FFF2-40B4-BE49-F238E27FC236}">
+                  <a16:creationId xmlns:a16="http://schemas.microsoft.com/office/drawing/2014/main" id="{4504AA70-C8AE-4D05-A462-000054B8603D}"/>
+                </a:ext>
+              </a:extLst>
+            </p:cNvPr>
             <p:cNvPicPr preferRelativeResize="0"/>
             <p:nvPr/>
           </p:nvPicPr>
@@ -6641,7 +6950,13 @@
         </p:pic>
         <p:sp>
           <p:nvSpPr>
-            <p:cNvPr id="49" name="Google Shape;49;p7"/>
+            <p:cNvPr id="8" name="Google Shape;49;p7">
+              <a:extLst>
+                <a:ext uri="{FF2B5EF4-FFF2-40B4-BE49-F238E27FC236}">
+                  <a16:creationId xmlns:a16="http://schemas.microsoft.com/office/drawing/2014/main" id="{1423D6FC-0C7C-4B47-A707-55450885F769}"/>
+                </a:ext>
+              </a:extLst>
+            </p:cNvPr>
             <p:cNvSpPr txBox="1"/>
             <p:nvPr/>
           </p:nvSpPr>
@@ -6649,6 +6964,344 @@
             <a:xfrm>
               <a:off x="1077200" y="1154350"/>
               <a:ext cx="3026400" cy="436500"/>
+            </a:xfrm>
+            <a:prstGeom prst="rect">
+              <a:avLst/>
+            </a:prstGeom>
+            <a:noFill/>
+            <a:ln>
+              <a:noFill/>
+            </a:ln>
+          </p:spPr>
+          <p:txBody>
+            <a:bodyPr spcFirstLastPara="1" wrap="square" lIns="91425" tIns="91425" rIns="91425" bIns="91425" anchor="t" anchorCtr="0">
+              <a:noAutofit/>
+            </a:bodyPr>
+            <a:lstStyle/>
+            <a:p>
+              <a:pPr marL="0" marR="0" lvl="0" indent="0" algn="l" defTabSz="914400" rtl="0" eaLnBrk="1" fontAlgn="auto" latinLnBrk="0" hangingPunct="1">
+                <a:lnSpc>
+                  <a:spcPct val="100000"/>
+                </a:lnSpc>
+                <a:spcBef>
+                  <a:spcPts val="0"/>
+                </a:spcBef>
+                <a:spcAft>
+                  <a:spcPts val="0"/>
+                </a:spcAft>
+                <a:buClr>
+                  <a:srgbClr val="000000"/>
+                </a:buClr>
+                <a:buSzTx/>
+                <a:buFont typeface="Arial"/>
+                <a:buNone/>
+                <a:tabLst/>
+                <a:defRPr/>
+              </a:pPr>
+              <a:r>
+                <a:rPr kumimoji="0" lang="en-US" sz="1400" b="1" i="0" u="none" strike="noStrike" kern="0" cap="none" spc="0" normalizeH="0" baseline="0" noProof="0" dirty="0">
+                  <a:ln>
+                    <a:noFill/>
+                  </a:ln>
+                  <a:solidFill>
+                    <a:srgbClr val="000000"/>
+                  </a:solidFill>
+                  <a:effectLst/>
+                  <a:uLnTx/>
+                  <a:uFillTx/>
+                  <a:latin typeface="Corbel"/>
+                  <a:ea typeface="Corbel"/>
+                  <a:cs typeface="Corbel"/>
+                  <a:sym typeface="Corbel"/>
+                </a:rPr>
+                <a:t>Solution Overview </a:t>
+              </a:r>
+              <a:endParaRPr kumimoji="0" sz="1400" b="1" i="0" u="none" strike="noStrike" kern="0" cap="none" spc="0" normalizeH="0" baseline="0" noProof="0" dirty="0">
+                <a:ln>
+                  <a:noFill/>
+                </a:ln>
+                <a:solidFill>
+                  <a:srgbClr val="000000"/>
+                </a:solidFill>
+                <a:effectLst/>
+                <a:uLnTx/>
+                <a:uFillTx/>
+                <a:latin typeface="Corbel"/>
+                <a:ea typeface="Corbel"/>
+                <a:cs typeface="Corbel"/>
+                <a:sym typeface="Corbel"/>
+              </a:endParaRPr>
+            </a:p>
+          </p:txBody>
+        </p:sp>
+        <p:sp>
+          <p:nvSpPr>
+            <p:cNvPr id="9" name="Google Shape;52;p7">
+              <a:extLst>
+                <a:ext uri="{FF2B5EF4-FFF2-40B4-BE49-F238E27FC236}">
+                  <a16:creationId xmlns:a16="http://schemas.microsoft.com/office/drawing/2014/main" id="{300042CB-2803-471E-A1F6-45AE18B4B9CE}"/>
+                </a:ext>
+              </a:extLst>
+            </p:cNvPr>
+            <p:cNvSpPr txBox="1"/>
+            <p:nvPr/>
+          </p:nvSpPr>
+          <p:spPr>
+            <a:xfrm>
+              <a:off x="650968" y="1590839"/>
+              <a:ext cx="4934400" cy="2338222"/>
+            </a:xfrm>
+            <a:prstGeom prst="rect">
+              <a:avLst/>
+            </a:prstGeom>
+            <a:noFill/>
+            <a:ln>
+              <a:noFill/>
+            </a:ln>
+          </p:spPr>
+          <p:txBody>
+            <a:bodyPr spcFirstLastPara="1" wrap="square" lIns="91425" tIns="91425" rIns="91425" bIns="91425" anchor="t" anchorCtr="0">
+              <a:noAutofit/>
+            </a:bodyPr>
+            <a:lstStyle/>
+            <a:p>
+              <a:pPr>
+                <a:buClr>
+                  <a:srgbClr val="000000"/>
+                </a:buClr>
+                <a:buSzPts val="1400"/>
+              </a:pPr>
+              <a:r>
+                <a:rPr lang="en-US" sz="1200" b="1" dirty="0">
+                  <a:effectLst/>
+                  <a:latin typeface="Corbel" panose="020B0503020204020204" pitchFamily="34" charset="0"/>
+                </a:rPr>
+                <a:t>Showcase the benefits  and usage of a modern-day Data Lake House Architecture.</a:t>
+              </a:r>
+            </a:p>
+            <a:p>
+              <a:pPr marL="285750" indent="-285750">
+                <a:buClr>
+                  <a:srgbClr val="000000"/>
+                </a:buClr>
+                <a:buSzPts val="1400"/>
+                <a:buFont typeface="Arial" panose="020B0604020202020204" pitchFamily="34" charset="0"/>
+                <a:buChar char="•"/>
+              </a:pPr>
+              <a:r>
+                <a:rPr lang="en-US" sz="1200" dirty="0">
+                  <a:latin typeface="Corbel" panose="020B0503020204020204" pitchFamily="34" charset="0"/>
+                </a:rPr>
+                <a:t>Implement Lake House infrastructure and deployments across 4 accounts, in 2 separate regions.</a:t>
+              </a:r>
+            </a:p>
+            <a:p>
+              <a:pPr marL="285750" indent="-285750">
+                <a:buClr>
+                  <a:srgbClr val="000000"/>
+                </a:buClr>
+                <a:buSzPts val="1400"/>
+                <a:buFont typeface="Arial" panose="020B0604020202020204" pitchFamily="34" charset="0"/>
+                <a:buChar char="•"/>
+              </a:pPr>
+              <a:r>
+                <a:rPr lang="en-US" sz="1200" dirty="0">
+                  <a:latin typeface="Corbel" panose="020B0503020204020204" pitchFamily="34" charset="0"/>
+                </a:rPr>
+                <a:t>Exhibit Cross-Account </a:t>
+              </a:r>
+              <a:r>
+                <a:rPr lang="en-US" sz="1200" b="1" dirty="0">
+                  <a:latin typeface="Corbel" panose="020B0503020204020204" pitchFamily="34" charset="0"/>
+                </a:rPr>
+                <a:t>Data Governance</a:t>
+              </a:r>
+            </a:p>
+            <a:p>
+              <a:pPr marL="285750" indent="-285750">
+                <a:buClr>
+                  <a:srgbClr val="000000"/>
+                </a:buClr>
+                <a:buSzPts val="1400"/>
+                <a:buFont typeface="Arial" panose="020B0604020202020204" pitchFamily="34" charset="0"/>
+                <a:buChar char="•"/>
+              </a:pPr>
+              <a:r>
+                <a:rPr lang="en-US" sz="1200" dirty="0">
+                  <a:latin typeface="Corbel" panose="020B0503020204020204" pitchFamily="34" charset="0"/>
+                </a:rPr>
+                <a:t>Exhibit the concept of a </a:t>
+              </a:r>
+              <a:r>
+                <a:rPr lang="en-US" sz="1200" b="1" i="1" dirty="0">
+                  <a:latin typeface="Corbel" panose="020B0503020204020204" pitchFamily="34" charset="0"/>
+                </a:rPr>
+                <a:t>Data </a:t>
+              </a:r>
+              <a:r>
+                <a:rPr lang="en-US" sz="1200" b="1" dirty="0">
+                  <a:latin typeface="Corbel" panose="020B0503020204020204" pitchFamily="34" charset="0"/>
+                </a:rPr>
+                <a:t>Mesh</a:t>
+              </a:r>
+            </a:p>
+            <a:p>
+              <a:pPr marL="285750" indent="-285750">
+                <a:buClr>
+                  <a:srgbClr val="000000"/>
+                </a:buClr>
+                <a:buSzPts val="1400"/>
+                <a:buFont typeface="Arial" panose="020B0604020202020204" pitchFamily="34" charset="0"/>
+                <a:buChar char="•"/>
+              </a:pPr>
+              <a:r>
+                <a:rPr lang="en-US" sz="1200" dirty="0">
+                  <a:latin typeface="Corbel" panose="020B0503020204020204" pitchFamily="34" charset="0"/>
+                </a:rPr>
+                <a:t>Perform data lake ingestion, curation, and catalog components.</a:t>
+              </a:r>
+            </a:p>
+            <a:p>
+              <a:pPr marL="285750" indent="-285750">
+                <a:buClr>
+                  <a:srgbClr val="000000"/>
+                </a:buClr>
+                <a:buSzPts val="1400"/>
+                <a:buFont typeface="Arial" panose="020B0604020202020204" pitchFamily="34" charset="0"/>
+                <a:buChar char="•"/>
+              </a:pPr>
+              <a:r>
+                <a:rPr lang="en-US" sz="1200" b="1" i="1" dirty="0">
+                  <a:latin typeface="Corbel" panose="020B0503020204020204" pitchFamily="34" charset="0"/>
+                </a:rPr>
+                <a:t>Orchestrate </a:t>
+              </a:r>
+              <a:r>
+                <a:rPr lang="en-US" sz="1200" dirty="0">
+                  <a:latin typeface="Corbel" panose="020B0503020204020204" pitchFamily="34" charset="0"/>
+                </a:rPr>
+                <a:t>the entire process from data ingestion to catalog exposure, from end-to-end.</a:t>
+              </a:r>
+            </a:p>
+            <a:p>
+              <a:pPr marL="285750" indent="-285750">
+                <a:buClr>
+                  <a:srgbClr val="000000"/>
+                </a:buClr>
+                <a:buSzPts val="1400"/>
+                <a:buFont typeface="Arial" panose="020B0604020202020204" pitchFamily="34" charset="0"/>
+                <a:buChar char="•"/>
+              </a:pPr>
+              <a:endParaRPr lang="en-US" sz="1200" b="1" dirty="0">
+                <a:effectLst/>
+                <a:latin typeface="Corbel" panose="020B0503020204020204" pitchFamily="34" charset="0"/>
+              </a:endParaRPr>
+            </a:p>
+            <a:p>
+              <a:pPr marL="0" marR="0" lvl="0" indent="0" algn="l" defTabSz="914400" rtl="0" eaLnBrk="1" fontAlgn="auto" latinLnBrk="0" hangingPunct="1">
+                <a:lnSpc>
+                  <a:spcPct val="100000"/>
+                </a:lnSpc>
+                <a:spcBef>
+                  <a:spcPts val="0"/>
+                </a:spcBef>
+                <a:spcAft>
+                  <a:spcPts val="0"/>
+                </a:spcAft>
+                <a:buClr>
+                  <a:srgbClr val="000000"/>
+                </a:buClr>
+                <a:buSzPts val="1400"/>
+                <a:buFont typeface="Arial"/>
+                <a:buNone/>
+                <a:tabLst/>
+                <a:defRPr/>
+              </a:pPr>
+              <a:endParaRPr kumimoji="0" sz="1200" b="0" i="0" u="none" strike="noStrike" kern="0" cap="none" spc="0" normalizeH="0" baseline="0" noProof="0" dirty="0">
+                <a:ln>
+                  <a:noFill/>
+                </a:ln>
+                <a:effectLst/>
+                <a:uLnTx/>
+                <a:uFillTx/>
+                <a:latin typeface="Corbel"/>
+                <a:ea typeface="Corbel"/>
+                <a:cs typeface="Corbel"/>
+                <a:sym typeface="Corbel"/>
+              </a:endParaRPr>
+            </a:p>
+          </p:txBody>
+        </p:sp>
+      </p:grpSp>
+      <p:grpSp>
+        <p:nvGrpSpPr>
+          <p:cNvPr id="10" name="Group 9">
+            <a:extLst>
+              <a:ext uri="{FF2B5EF4-FFF2-40B4-BE49-F238E27FC236}">
+                <a16:creationId xmlns:a16="http://schemas.microsoft.com/office/drawing/2014/main" id="{1B7982BF-331B-4626-B983-BC4ADDC27AEA}"/>
+              </a:ext>
+            </a:extLst>
+          </p:cNvPr>
+          <p:cNvGrpSpPr/>
+          <p:nvPr/>
+        </p:nvGrpSpPr>
+        <p:grpSpPr>
+          <a:xfrm>
+            <a:off x="7214187" y="3133178"/>
+            <a:ext cx="4755106" cy="2849500"/>
+            <a:chOff x="582251" y="3949073"/>
+            <a:chExt cx="4956874" cy="2849500"/>
+          </a:xfrm>
+        </p:grpSpPr>
+        <p:pic>
+          <p:nvPicPr>
+            <p:cNvPr id="11" name="Google Shape;50;p7">
+              <a:extLst>
+                <a:ext uri="{FF2B5EF4-FFF2-40B4-BE49-F238E27FC236}">
+                  <a16:creationId xmlns:a16="http://schemas.microsoft.com/office/drawing/2014/main" id="{BDA6ADB9-C500-4504-8AC4-221A3D6B132E}"/>
+                </a:ext>
+              </a:extLst>
+            </p:cNvPr>
+            <p:cNvPicPr preferRelativeResize="0"/>
+            <p:nvPr/>
+          </p:nvPicPr>
+          <p:blipFill rotWithShape="1">
+            <a:blip r:embed="rId4">
+              <a:alphaModFix/>
+            </a:blip>
+            <a:srcRect b="10"/>
+            <a:stretch/>
+          </p:blipFill>
+          <p:spPr>
+            <a:xfrm>
+              <a:off x="582251" y="3964851"/>
+              <a:ext cx="405000" cy="404970"/>
+            </a:xfrm>
+            <a:prstGeom prst="rect">
+              <a:avLst/>
+            </a:prstGeom>
+            <a:noFill/>
+            <a:ln>
+              <a:noFill/>
+            </a:ln>
+          </p:spPr>
+        </p:pic>
+        <p:sp>
+          <p:nvSpPr>
+            <p:cNvPr id="12" name="Google Shape;51;p7">
+              <a:extLst>
+                <a:ext uri="{FF2B5EF4-FFF2-40B4-BE49-F238E27FC236}">
+                  <a16:creationId xmlns:a16="http://schemas.microsoft.com/office/drawing/2014/main" id="{4D0D14D9-47E1-428A-9291-6F0DBF5B8B80}"/>
+                </a:ext>
+              </a:extLst>
+            </p:cNvPr>
+            <p:cNvSpPr txBox="1"/>
+            <p:nvPr/>
+          </p:nvSpPr>
+          <p:spPr>
+            <a:xfrm>
+              <a:off x="1003050" y="3949073"/>
+              <a:ext cx="2057700" cy="436500"/>
             </a:xfrm>
             <a:prstGeom prst="rect">
               <a:avLst/>
@@ -6699,7 +7352,7 @@
                   <a:cs typeface="Corbel"/>
                   <a:sym typeface="Corbel"/>
                 </a:rPr>
-                <a:t>Solution Overview </a:t>
+                <a:t>Outcomes</a:t>
               </a:r>
               <a:endParaRPr kumimoji="0" sz="1600" b="1" i="0" u="none" strike="noStrike" kern="0" cap="none" spc="0" normalizeH="0" baseline="0" noProof="0" dirty="0">
                 <a:ln>
@@ -6721,528 +7374,13 @@
         </p:sp>
         <p:sp>
           <p:nvSpPr>
-            <p:cNvPr id="52" name="Google Shape;52;p7"/>
-            <p:cNvSpPr txBox="1"/>
-            <p:nvPr/>
-          </p:nvSpPr>
-          <p:spPr>
-            <a:xfrm>
-              <a:off x="650968" y="1590839"/>
-              <a:ext cx="4934400" cy="2338222"/>
-            </a:xfrm>
-            <a:prstGeom prst="rect">
-              <a:avLst/>
-            </a:prstGeom>
-            <a:noFill/>
-            <a:ln>
-              <a:noFill/>
-            </a:ln>
-          </p:spPr>
-          <p:txBody>
-            <a:bodyPr spcFirstLastPara="1" wrap="square" lIns="91425" tIns="91425" rIns="91425" bIns="91425" anchor="t" anchorCtr="0">
-              <a:noAutofit/>
-            </a:bodyPr>
-            <a:lstStyle/>
-            <a:p>
-              <a:pPr marL="0" marR="0" lvl="0" indent="0" algn="l" defTabSz="914400" rtl="0" eaLnBrk="1" fontAlgn="auto" latinLnBrk="0" hangingPunct="1">
-                <a:lnSpc>
-                  <a:spcPct val="100000"/>
-                </a:lnSpc>
-                <a:spcBef>
-                  <a:spcPts val="0"/>
-                </a:spcBef>
-                <a:spcAft>
-                  <a:spcPts val="0"/>
-                </a:spcAft>
-                <a:buClr>
-                  <a:srgbClr val="000000"/>
-                </a:buClr>
-                <a:buSzPts val="1400"/>
-                <a:buFontTx/>
-                <a:buNone/>
-                <a:tabLst/>
-                <a:defRPr/>
-              </a:pPr>
-              <a:r>
-                <a:rPr kumimoji="0" lang="en-US" sz="1400" b="1" i="0" u="none" strike="noStrike" kern="1200" cap="none" spc="0" normalizeH="0" baseline="0" noProof="0" dirty="0">
-                  <a:ln>
-                    <a:noFill/>
-                  </a:ln>
-                  <a:solidFill>
-                    <a:srgbClr val="3B3B3B"/>
-                  </a:solidFill>
-                  <a:effectLst/>
-                  <a:uLnTx/>
-                  <a:uFillTx/>
-                  <a:latin typeface="Corbel" panose="020B0503020204020204" pitchFamily="34" charset="0"/>
-                  <a:ea typeface="+mn-ea"/>
-                  <a:cs typeface="+mn-cs"/>
-                </a:rPr>
-                <a:t>Showcase the benefits  and usage of a modern-day Data Lake House Architecture.</a:t>
-              </a:r>
-            </a:p>
-            <a:p>
-              <a:pPr marL="285750" marR="0" lvl="0" indent="-285750" algn="l" defTabSz="914400" rtl="0" eaLnBrk="1" fontAlgn="auto" latinLnBrk="0" hangingPunct="1">
-                <a:lnSpc>
-                  <a:spcPct val="100000"/>
-                </a:lnSpc>
-                <a:spcBef>
-                  <a:spcPts val="0"/>
-                </a:spcBef>
-                <a:spcAft>
-                  <a:spcPts val="0"/>
-                </a:spcAft>
-                <a:buClr>
-                  <a:srgbClr val="000000"/>
-                </a:buClr>
-                <a:buSzPts val="1400"/>
-                <a:buFont typeface="Arial" panose="020B0604020202020204" pitchFamily="34" charset="0"/>
-                <a:buChar char="•"/>
-                <a:tabLst/>
-                <a:defRPr/>
-              </a:pPr>
-              <a:r>
-                <a:rPr kumimoji="0" lang="en-US" sz="1400" b="0" i="0" u="none" strike="noStrike" kern="1200" cap="none" spc="0" normalizeH="0" baseline="0" noProof="0" dirty="0">
-                  <a:ln>
-                    <a:noFill/>
-                  </a:ln>
-                  <a:solidFill>
-                    <a:srgbClr val="3B3B3B"/>
-                  </a:solidFill>
-                  <a:effectLst/>
-                  <a:uLnTx/>
-                  <a:uFillTx/>
-                  <a:latin typeface="Corbel" panose="020B0503020204020204" pitchFamily="34" charset="0"/>
-                  <a:ea typeface="+mn-ea"/>
-                  <a:cs typeface="+mn-cs"/>
-                </a:rPr>
-                <a:t>Implement Lake House infrastructure and deployments across 4 accounts, in 2 separate regions.</a:t>
-              </a:r>
-            </a:p>
-            <a:p>
-              <a:pPr marL="285750" marR="0" lvl="0" indent="-285750" algn="l" defTabSz="914400" rtl="0" eaLnBrk="1" fontAlgn="auto" latinLnBrk="0" hangingPunct="1">
-                <a:lnSpc>
-                  <a:spcPct val="100000"/>
-                </a:lnSpc>
-                <a:spcBef>
-                  <a:spcPts val="0"/>
-                </a:spcBef>
-                <a:spcAft>
-                  <a:spcPts val="0"/>
-                </a:spcAft>
-                <a:buClr>
-                  <a:srgbClr val="000000"/>
-                </a:buClr>
-                <a:buSzPts val="1400"/>
-                <a:buFont typeface="Arial" panose="020B0604020202020204" pitchFamily="34" charset="0"/>
-                <a:buChar char="•"/>
-                <a:tabLst/>
-                <a:defRPr/>
-              </a:pPr>
-              <a:r>
-                <a:rPr kumimoji="0" lang="en-US" sz="1400" b="0" i="0" u="none" strike="noStrike" kern="1200" cap="none" spc="0" normalizeH="0" baseline="0" noProof="0" dirty="0">
-                  <a:ln>
-                    <a:noFill/>
-                  </a:ln>
-                  <a:solidFill>
-                    <a:srgbClr val="3B3B3B"/>
-                  </a:solidFill>
-                  <a:effectLst/>
-                  <a:uLnTx/>
-                  <a:uFillTx/>
-                  <a:latin typeface="Corbel" panose="020B0503020204020204" pitchFamily="34" charset="0"/>
-                  <a:ea typeface="+mn-ea"/>
-                  <a:cs typeface="+mn-cs"/>
-                </a:rPr>
-                <a:t>Exhibit Cross-Account </a:t>
-              </a:r>
-              <a:r>
-                <a:rPr kumimoji="0" lang="en-US" sz="1400" b="1" i="0" u="none" strike="noStrike" kern="1200" cap="none" spc="0" normalizeH="0" baseline="0" noProof="0" dirty="0">
-                  <a:ln>
-                    <a:noFill/>
-                  </a:ln>
-                  <a:solidFill>
-                    <a:srgbClr val="3B3B3B"/>
-                  </a:solidFill>
-                  <a:effectLst/>
-                  <a:uLnTx/>
-                  <a:uFillTx/>
-                  <a:latin typeface="Corbel" panose="020B0503020204020204" pitchFamily="34" charset="0"/>
-                  <a:ea typeface="+mn-ea"/>
-                  <a:cs typeface="+mn-cs"/>
-                </a:rPr>
-                <a:t>Data Governance</a:t>
-              </a:r>
-            </a:p>
-            <a:p>
-              <a:pPr marL="285750" marR="0" lvl="0" indent="-285750" algn="l" defTabSz="914400" rtl="0" eaLnBrk="1" fontAlgn="auto" latinLnBrk="0" hangingPunct="1">
-                <a:lnSpc>
-                  <a:spcPct val="100000"/>
-                </a:lnSpc>
-                <a:spcBef>
-                  <a:spcPts val="0"/>
-                </a:spcBef>
-                <a:spcAft>
-                  <a:spcPts val="0"/>
-                </a:spcAft>
-                <a:buClr>
-                  <a:srgbClr val="000000"/>
-                </a:buClr>
-                <a:buSzPts val="1400"/>
-                <a:buFont typeface="Arial" panose="020B0604020202020204" pitchFamily="34" charset="0"/>
-                <a:buChar char="•"/>
-                <a:tabLst/>
-                <a:defRPr/>
-              </a:pPr>
-              <a:r>
-                <a:rPr kumimoji="0" lang="en-US" sz="1400" b="0" i="0" u="none" strike="noStrike" kern="1200" cap="none" spc="0" normalizeH="0" baseline="0" noProof="0" dirty="0">
-                  <a:ln>
-                    <a:noFill/>
-                  </a:ln>
-                  <a:solidFill>
-                    <a:srgbClr val="3B3B3B"/>
-                  </a:solidFill>
-                  <a:effectLst/>
-                  <a:uLnTx/>
-                  <a:uFillTx/>
-                  <a:latin typeface="Corbel" panose="020B0503020204020204" pitchFamily="34" charset="0"/>
-                  <a:ea typeface="+mn-ea"/>
-                  <a:cs typeface="+mn-cs"/>
-                </a:rPr>
-                <a:t>Exhibit the concept of a </a:t>
-              </a:r>
-              <a:r>
-                <a:rPr kumimoji="0" lang="en-US" sz="1400" b="1" i="1" u="none" strike="noStrike" kern="1200" cap="none" spc="0" normalizeH="0" baseline="0" noProof="0" dirty="0">
-                  <a:ln>
-                    <a:noFill/>
-                  </a:ln>
-                  <a:solidFill>
-                    <a:srgbClr val="3B3B3B"/>
-                  </a:solidFill>
-                  <a:effectLst/>
-                  <a:uLnTx/>
-                  <a:uFillTx/>
-                  <a:latin typeface="Corbel" panose="020B0503020204020204" pitchFamily="34" charset="0"/>
-                  <a:ea typeface="+mn-ea"/>
-                  <a:cs typeface="+mn-cs"/>
-                </a:rPr>
-                <a:t>Data </a:t>
-              </a:r>
-              <a:r>
-                <a:rPr kumimoji="0" lang="en-US" sz="1400" b="1" i="0" u="none" strike="noStrike" kern="1200" cap="none" spc="0" normalizeH="0" baseline="0" noProof="0" dirty="0">
-                  <a:ln>
-                    <a:noFill/>
-                  </a:ln>
-                  <a:solidFill>
-                    <a:srgbClr val="3B3B3B"/>
-                  </a:solidFill>
-                  <a:effectLst/>
-                  <a:uLnTx/>
-                  <a:uFillTx/>
-                  <a:latin typeface="Corbel" panose="020B0503020204020204" pitchFamily="34" charset="0"/>
-                  <a:ea typeface="+mn-ea"/>
-                  <a:cs typeface="+mn-cs"/>
-                </a:rPr>
-                <a:t>Mesh</a:t>
-              </a:r>
-            </a:p>
-            <a:p>
-              <a:pPr marL="285750" marR="0" lvl="0" indent="-285750" algn="l" defTabSz="914400" rtl="0" eaLnBrk="1" fontAlgn="auto" latinLnBrk="0" hangingPunct="1">
-                <a:lnSpc>
-                  <a:spcPct val="100000"/>
-                </a:lnSpc>
-                <a:spcBef>
-                  <a:spcPts val="0"/>
-                </a:spcBef>
-                <a:spcAft>
-                  <a:spcPts val="0"/>
-                </a:spcAft>
-                <a:buClr>
-                  <a:srgbClr val="000000"/>
-                </a:buClr>
-                <a:buSzPts val="1400"/>
-                <a:buFont typeface="Arial" panose="020B0604020202020204" pitchFamily="34" charset="0"/>
-                <a:buChar char="•"/>
-                <a:tabLst/>
-                <a:defRPr/>
-              </a:pPr>
-              <a:r>
-                <a:rPr kumimoji="0" lang="en-US" sz="1400" b="0" i="0" u="none" strike="noStrike" kern="1200" cap="none" spc="0" normalizeH="0" baseline="0" noProof="0" dirty="0">
-                  <a:ln>
-                    <a:noFill/>
-                  </a:ln>
-                  <a:solidFill>
-                    <a:srgbClr val="3B3B3B"/>
-                  </a:solidFill>
-                  <a:effectLst/>
-                  <a:uLnTx/>
-                  <a:uFillTx/>
-                  <a:latin typeface="Corbel" panose="020B0503020204020204" pitchFamily="34" charset="0"/>
-                  <a:ea typeface="+mn-ea"/>
-                  <a:cs typeface="+mn-cs"/>
-                </a:rPr>
-                <a:t>Perform data lake ingestion, curation, and catalog components.</a:t>
-              </a:r>
-            </a:p>
-            <a:p>
-              <a:pPr marL="285750" marR="0" lvl="0" indent="-285750" algn="l" defTabSz="914400" rtl="0" eaLnBrk="1" fontAlgn="auto" latinLnBrk="0" hangingPunct="1">
-                <a:lnSpc>
-                  <a:spcPct val="100000"/>
-                </a:lnSpc>
-                <a:spcBef>
-                  <a:spcPts val="0"/>
-                </a:spcBef>
-                <a:spcAft>
-                  <a:spcPts val="0"/>
-                </a:spcAft>
-                <a:buClr>
-                  <a:srgbClr val="000000"/>
-                </a:buClr>
-                <a:buSzPts val="1400"/>
-                <a:buFont typeface="Arial" panose="020B0604020202020204" pitchFamily="34" charset="0"/>
-                <a:buChar char="•"/>
-                <a:tabLst/>
-                <a:defRPr/>
-              </a:pPr>
-              <a:r>
-                <a:rPr kumimoji="0" lang="en-US" sz="1400" b="1" i="1" u="none" strike="noStrike" kern="1200" cap="none" spc="0" normalizeH="0" baseline="0" noProof="0" dirty="0">
-                  <a:ln>
-                    <a:noFill/>
-                  </a:ln>
-                  <a:solidFill>
-                    <a:srgbClr val="3B3B3B"/>
-                  </a:solidFill>
-                  <a:effectLst/>
-                  <a:uLnTx/>
-                  <a:uFillTx/>
-                  <a:latin typeface="Corbel" panose="020B0503020204020204" pitchFamily="34" charset="0"/>
-                  <a:ea typeface="+mn-ea"/>
-                  <a:cs typeface="+mn-cs"/>
-                </a:rPr>
-                <a:t>Orchestrate </a:t>
-              </a:r>
-              <a:r>
-                <a:rPr kumimoji="0" lang="en-US" sz="1400" b="0" i="0" u="none" strike="noStrike" kern="1200" cap="none" spc="0" normalizeH="0" baseline="0" noProof="0" dirty="0">
-                  <a:ln>
-                    <a:noFill/>
-                  </a:ln>
-                  <a:solidFill>
-                    <a:srgbClr val="3B3B3B"/>
-                  </a:solidFill>
-                  <a:effectLst/>
-                  <a:uLnTx/>
-                  <a:uFillTx/>
-                  <a:latin typeface="Corbel" panose="020B0503020204020204" pitchFamily="34" charset="0"/>
-                  <a:ea typeface="+mn-ea"/>
-                  <a:cs typeface="+mn-cs"/>
-                </a:rPr>
-                <a:t>the entire process from data ingestion to catalog exposure, from end-to-end.</a:t>
-              </a:r>
-            </a:p>
-            <a:p>
-              <a:pPr marL="285750" marR="0" lvl="0" indent="-285750" algn="l" defTabSz="914400" rtl="0" eaLnBrk="1" fontAlgn="auto" latinLnBrk="0" hangingPunct="1">
-                <a:lnSpc>
-                  <a:spcPct val="100000"/>
-                </a:lnSpc>
-                <a:spcBef>
-                  <a:spcPts val="0"/>
-                </a:spcBef>
-                <a:spcAft>
-                  <a:spcPts val="0"/>
-                </a:spcAft>
-                <a:buClr>
-                  <a:srgbClr val="000000"/>
-                </a:buClr>
-                <a:buSzPts val="1400"/>
-                <a:buFont typeface="Arial" panose="020B0604020202020204" pitchFamily="34" charset="0"/>
-                <a:buChar char="•"/>
-                <a:tabLst/>
-                <a:defRPr/>
-              </a:pPr>
-              <a:endParaRPr kumimoji="0" lang="en-US" sz="1400" b="1" i="0" u="none" strike="noStrike" kern="1200" cap="none" spc="0" normalizeH="0" baseline="0" noProof="0" dirty="0">
-                <a:ln>
-                  <a:noFill/>
-                </a:ln>
-                <a:solidFill>
-                  <a:srgbClr val="3B3B3B"/>
-                </a:solidFill>
-                <a:effectLst/>
-                <a:uLnTx/>
-                <a:uFillTx/>
-                <a:latin typeface="Corbel" panose="020B0503020204020204" pitchFamily="34" charset="0"/>
-                <a:ea typeface="+mn-ea"/>
-                <a:cs typeface="+mn-cs"/>
-              </a:endParaRPr>
-            </a:p>
-            <a:p>
-              <a:pPr marL="0" marR="0" lvl="0" indent="0" algn="l" defTabSz="914400" rtl="0" eaLnBrk="1" fontAlgn="auto" latinLnBrk="0" hangingPunct="1">
-                <a:lnSpc>
-                  <a:spcPct val="100000"/>
-                </a:lnSpc>
-                <a:spcBef>
-                  <a:spcPts val="0"/>
-                </a:spcBef>
-                <a:spcAft>
-                  <a:spcPts val="0"/>
-                </a:spcAft>
-                <a:buClr>
-                  <a:srgbClr val="000000"/>
-                </a:buClr>
-                <a:buSzPts val="1400"/>
-                <a:buFont typeface="Arial"/>
-                <a:buNone/>
-                <a:tabLst/>
-                <a:defRPr/>
-              </a:pPr>
-              <a:endParaRPr kumimoji="0" sz="1400" b="0" i="0" u="none" strike="noStrike" kern="0" cap="none" spc="0" normalizeH="0" baseline="0" noProof="0" dirty="0">
-                <a:ln>
-                  <a:noFill/>
-                </a:ln>
-                <a:solidFill>
-                  <a:srgbClr val="3B3B3B"/>
-                </a:solidFill>
-                <a:effectLst/>
-                <a:uLnTx/>
-                <a:uFillTx/>
-                <a:latin typeface="Corbel"/>
-                <a:ea typeface="Corbel"/>
-                <a:cs typeface="Corbel"/>
-                <a:sym typeface="Corbel"/>
-              </a:endParaRPr>
-            </a:p>
-          </p:txBody>
-        </p:sp>
-      </p:grpSp>
-      <p:grpSp>
-        <p:nvGrpSpPr>
-          <p:cNvPr id="5" name="Group 4">
-            <a:extLst>
-              <a:ext uri="{FF2B5EF4-FFF2-40B4-BE49-F238E27FC236}">
-                <a16:creationId xmlns:a16="http://schemas.microsoft.com/office/drawing/2014/main" id="{9A32E196-22B7-47A4-B938-CB2A00CFC9EB}"/>
-              </a:ext>
-            </a:extLst>
-          </p:cNvPr>
-          <p:cNvGrpSpPr/>
-          <p:nvPr/>
-        </p:nvGrpSpPr>
-        <p:grpSpPr>
-          <a:xfrm>
-            <a:off x="6307301" y="3412711"/>
-            <a:ext cx="5145494" cy="2849500"/>
-            <a:chOff x="582251" y="3949073"/>
-            <a:chExt cx="4956874" cy="2849500"/>
-          </a:xfrm>
-        </p:grpSpPr>
-        <p:pic>
-          <p:nvPicPr>
-            <p:cNvPr id="50" name="Google Shape;50;p7"/>
-            <p:cNvPicPr preferRelativeResize="0"/>
-            <p:nvPr/>
-          </p:nvPicPr>
-          <p:blipFill rotWithShape="1">
-            <a:blip r:embed="rId4">
-              <a:alphaModFix/>
-            </a:blip>
-            <a:srcRect b="10"/>
-            <a:stretch/>
-          </p:blipFill>
-          <p:spPr>
-            <a:xfrm>
-              <a:off x="582251" y="3964851"/>
-              <a:ext cx="405000" cy="404970"/>
-            </a:xfrm>
-            <a:prstGeom prst="rect">
-              <a:avLst/>
-            </a:prstGeom>
-            <a:noFill/>
-            <a:ln>
-              <a:noFill/>
-            </a:ln>
-          </p:spPr>
-        </p:pic>
-        <p:sp>
-          <p:nvSpPr>
-            <p:cNvPr id="51" name="Google Shape;51;p7"/>
-            <p:cNvSpPr txBox="1"/>
-            <p:nvPr/>
-          </p:nvSpPr>
-          <p:spPr>
-            <a:xfrm>
-              <a:off x="1003050" y="3949073"/>
-              <a:ext cx="2057700" cy="436500"/>
-            </a:xfrm>
-            <a:prstGeom prst="rect">
-              <a:avLst/>
-            </a:prstGeom>
-            <a:noFill/>
-            <a:ln>
-              <a:noFill/>
-            </a:ln>
-          </p:spPr>
-          <p:txBody>
-            <a:bodyPr spcFirstLastPara="1" wrap="square" lIns="91425" tIns="91425" rIns="91425" bIns="91425" anchor="t" anchorCtr="0">
-              <a:noAutofit/>
-            </a:bodyPr>
-            <a:lstStyle/>
-            <a:p>
-              <a:pPr marL="0" marR="0" lvl="0" indent="0" algn="l" defTabSz="914400" rtl="0" eaLnBrk="1" fontAlgn="auto" latinLnBrk="0" hangingPunct="1">
-                <a:lnSpc>
-                  <a:spcPct val="100000"/>
-                </a:lnSpc>
-                <a:spcBef>
-                  <a:spcPts val="0"/>
-                </a:spcBef>
-                <a:spcAft>
-                  <a:spcPts val="0"/>
-                </a:spcAft>
-                <a:buClr>
-                  <a:srgbClr val="000000"/>
-                </a:buClr>
-                <a:buSzTx/>
-                <a:buFont typeface="Arial"/>
-                <a:buNone/>
-                <a:tabLst/>
-                <a:defRPr/>
-              </a:pPr>
-              <a:r>
-                <a:rPr kumimoji="0" lang="en-US" sz="1700" b="1" i="0" u="none" strike="noStrike" kern="0" cap="none" spc="0" normalizeH="0" baseline="0" noProof="0" dirty="0">
-                  <a:ln>
-                    <a:noFill/>
-                  </a:ln>
-                  <a:solidFill>
-                    <a:srgbClr val="000000"/>
-                  </a:solidFill>
-                  <a:effectLst/>
-                  <a:uLnTx/>
-                  <a:uFillTx/>
-                  <a:latin typeface="Corbel"/>
-                  <a:ea typeface="Corbel"/>
-                  <a:cs typeface="Corbel"/>
-                  <a:sym typeface="Corbel"/>
-                </a:rPr>
-                <a:t>Outcomes</a:t>
-              </a:r>
-              <a:endParaRPr kumimoji="0" sz="1700" b="1" i="0" u="none" strike="noStrike" kern="0" cap="none" spc="0" normalizeH="0" baseline="0" noProof="0" dirty="0">
-                <a:ln>
-                  <a:noFill/>
-                </a:ln>
-                <a:solidFill>
-                  <a:srgbClr val="000000"/>
-                </a:solidFill>
-                <a:effectLst/>
-                <a:uLnTx/>
-                <a:uFillTx/>
-                <a:latin typeface="Corbel"/>
-                <a:ea typeface="Corbel"/>
-                <a:cs typeface="Corbel"/>
-                <a:sym typeface="Corbel"/>
-              </a:endParaRPr>
-            </a:p>
-          </p:txBody>
-        </p:sp>
-        <p:sp>
-          <p:nvSpPr>
-            <p:cNvPr id="53" name="Google Shape;53;p7"/>
+            <p:cNvPr id="13" name="Google Shape;53;p7">
+              <a:extLst>
+                <a:ext uri="{FF2B5EF4-FFF2-40B4-BE49-F238E27FC236}">
+                  <a16:creationId xmlns:a16="http://schemas.microsoft.com/office/drawing/2014/main" id="{240ADA7E-7333-4292-8F92-29F1CDC14B86}"/>
+                </a:ext>
+              </a:extLst>
+            </p:cNvPr>
             <p:cNvSpPr txBox="1"/>
             <p:nvPr/>
           </p:nvSpPr>
@@ -7265,599 +7403,225 @@
             </a:bodyPr>
             <a:lstStyle/>
             <a:p>
-              <a:pPr marL="457200" marR="0" lvl="0" indent="-317500" algn="l" defTabSz="914400" rtl="0" eaLnBrk="1" fontAlgn="auto" latinLnBrk="0" hangingPunct="1">
-                <a:lnSpc>
-                  <a:spcPct val="100000"/>
-                </a:lnSpc>
-                <a:spcBef>
-                  <a:spcPts val="0"/>
-                </a:spcBef>
-                <a:spcAft>
-                  <a:spcPts val="0"/>
-                </a:spcAft>
+              <a:pPr marL="457200" indent="-317500">
                 <a:buClr>
                   <a:srgbClr val="000000"/>
                 </a:buClr>
                 <a:buSzPts val="1400"/>
                 <a:buFont typeface="Arial" panose="020B0604020202020204" pitchFamily="34" charset="0"/>
                 <a:buChar char="•"/>
-                <a:tabLst/>
-                <a:defRPr/>
               </a:pPr>
               <a:r>
-                <a:rPr kumimoji="0" lang="en-US" sz="1300" b="0" i="0" u="none" strike="noStrike" kern="1200" cap="none" spc="0" normalizeH="0" baseline="0" noProof="0" dirty="0">
-                  <a:ln>
-                    <a:noFill/>
-                  </a:ln>
-                  <a:solidFill>
-                    <a:srgbClr val="3B3B3B"/>
-                  </a:solidFill>
-                  <a:effectLst/>
-                  <a:uLnTx/>
-                  <a:uFillTx/>
+                <a:rPr lang="en-US" sz="1200" dirty="0">
                   <a:latin typeface="Corbel" panose="020B0503020204020204" pitchFamily="34" charset="0"/>
-                  <a:ea typeface="+mn-ea"/>
-                  <a:cs typeface="+mn-cs"/>
                 </a:rPr>
                 <a:t>Cross-account data queries </a:t>
               </a:r>
               <a:r>
-                <a:rPr kumimoji="0" lang="en-US" sz="1300" b="1" i="1" u="none" strike="noStrike" kern="1200" cap="none" spc="0" normalizeH="0" baseline="0" noProof="0" dirty="0">
-                  <a:ln>
-                    <a:noFill/>
-                  </a:ln>
-                  <a:solidFill>
-                    <a:srgbClr val="3B3B3B"/>
-                  </a:solidFill>
-                  <a:effectLst/>
-                  <a:uLnTx/>
-                  <a:uFillTx/>
+                <a:rPr lang="en-US" sz="1200" b="1" i="1" dirty="0">
                   <a:latin typeface="Corbel" panose="020B0503020204020204" pitchFamily="34" charset="0"/>
-                  <a:ea typeface="+mn-ea"/>
-                  <a:cs typeface="+mn-cs"/>
                 </a:rPr>
                 <a:t>performed directly against a Lake Formation Data Lake </a:t>
               </a:r>
               <a:r>
-                <a:rPr kumimoji="0" lang="en-US" sz="1300" b="0" i="0" u="none" strike="noStrike" kern="1200" cap="none" spc="0" normalizeH="0" baseline="0" noProof="0" dirty="0">
-                  <a:ln>
-                    <a:noFill/>
-                  </a:ln>
-                  <a:solidFill>
-                    <a:srgbClr val="3B3B3B"/>
-                  </a:solidFill>
-                  <a:effectLst/>
-                  <a:uLnTx/>
-                  <a:uFillTx/>
+                <a:rPr lang="en-US" sz="1200" dirty="0">
                   <a:latin typeface="Corbel" panose="020B0503020204020204" pitchFamily="34" charset="0"/>
-                  <a:ea typeface="+mn-ea"/>
-                  <a:cs typeface="+mn-cs"/>
                 </a:rPr>
                 <a:t>through </a:t>
               </a:r>
               <a:r>
-                <a:rPr kumimoji="0" lang="en-US" sz="1300" b="1" i="1" u="none" strike="noStrike" kern="1200" cap="none" spc="0" normalizeH="0" baseline="0" noProof="0" dirty="0">
-                  <a:ln>
-                    <a:noFill/>
-                  </a:ln>
-                  <a:solidFill>
-                    <a:srgbClr val="3B3B3B"/>
-                  </a:solidFill>
-                  <a:effectLst/>
-                  <a:uLnTx/>
-                  <a:uFillTx/>
+                <a:rPr lang="en-US" sz="1200" b="1" i="1" dirty="0">
                   <a:latin typeface="Corbel" panose="020B0503020204020204" pitchFamily="34" charset="0"/>
-                  <a:ea typeface="+mn-ea"/>
-                  <a:cs typeface="+mn-cs"/>
                 </a:rPr>
                 <a:t>Redshift Spectrum External Tables</a:t>
               </a:r>
               <a:r>
-                <a:rPr kumimoji="0" lang="en-US" sz="1300" b="0" i="0" u="none" strike="noStrike" kern="1200" cap="none" spc="0" normalizeH="0" baseline="0" noProof="0" dirty="0">
-                  <a:ln>
-                    <a:noFill/>
-                  </a:ln>
-                  <a:solidFill>
-                    <a:srgbClr val="3B3B3B"/>
-                  </a:solidFill>
-                  <a:effectLst/>
-                  <a:uLnTx/>
-                  <a:uFillTx/>
+                <a:rPr lang="en-US" sz="1200" dirty="0">
                   <a:latin typeface="Corbel" panose="020B0503020204020204" pitchFamily="34" charset="0"/>
-                  <a:ea typeface="+mn-ea"/>
-                  <a:cs typeface="+mn-cs"/>
                 </a:rPr>
                 <a:t> and </a:t>
               </a:r>
               <a:r>
-                <a:rPr kumimoji="0" lang="en-US" sz="1300" b="1" i="1" u="none" strike="noStrike" kern="1200" cap="none" spc="0" normalizeH="0" baseline="0" noProof="0" dirty="0">
-                  <a:ln>
-                    <a:noFill/>
-                  </a:ln>
-                  <a:solidFill>
-                    <a:srgbClr val="3B3B3B"/>
-                  </a:solidFill>
-                  <a:effectLst/>
-                  <a:uLnTx/>
-                  <a:uFillTx/>
+                <a:rPr lang="en-US" sz="1200" b="1" i="1" dirty="0">
                   <a:latin typeface="Corbel" panose="020B0503020204020204" pitchFamily="34" charset="0"/>
-                  <a:ea typeface="+mn-ea"/>
-                  <a:cs typeface="+mn-cs"/>
                 </a:rPr>
                 <a:t>Athena</a:t>
               </a:r>
               <a:r>
-                <a:rPr kumimoji="0" lang="en-US" sz="1300" b="0" i="0" u="none" strike="noStrike" kern="1200" cap="none" spc="0" normalizeH="0" baseline="0" noProof="0" dirty="0">
-                  <a:ln>
-                    <a:noFill/>
-                  </a:ln>
-                  <a:solidFill>
-                    <a:srgbClr val="3B3B3B"/>
-                  </a:solidFill>
-                  <a:effectLst/>
-                  <a:uLnTx/>
-                  <a:uFillTx/>
+                <a:rPr lang="en-US" sz="1200" dirty="0">
                   <a:latin typeface="Corbel" panose="020B0503020204020204" pitchFamily="34" charset="0"/>
-                  <a:ea typeface="+mn-ea"/>
-                  <a:cs typeface="+mn-cs"/>
                 </a:rPr>
                 <a:t>.</a:t>
               </a:r>
               <a:r>
-                <a:rPr kumimoji="0" lang="en-US" sz="1300" b="1" i="1" u="none" strike="noStrike" kern="1200" cap="none" spc="0" normalizeH="0" baseline="0" noProof="0" dirty="0">
-                  <a:ln>
-                    <a:noFill/>
-                  </a:ln>
-                  <a:solidFill>
-                    <a:srgbClr val="3B3B3B"/>
-                  </a:solidFill>
-                  <a:effectLst/>
-                  <a:uLnTx/>
-                  <a:uFillTx/>
+                <a:rPr lang="en-US" sz="1200" b="1" i="1" dirty="0">
                   <a:latin typeface="Corbel" panose="020B0503020204020204" pitchFamily="34" charset="0"/>
-                  <a:ea typeface="+mn-ea"/>
-                  <a:cs typeface="+mn-cs"/>
                 </a:rPr>
                 <a:t> No need </a:t>
               </a:r>
               <a:r>
-                <a:rPr kumimoji="0" lang="en-US" sz="1300" b="0" i="0" u="none" strike="noStrike" kern="1200" cap="none" spc="0" normalizeH="0" baseline="0" noProof="0" dirty="0">
-                  <a:ln>
-                    <a:noFill/>
-                  </a:ln>
-                  <a:solidFill>
-                    <a:srgbClr val="3B3B3B"/>
-                  </a:solidFill>
-                  <a:effectLst/>
-                  <a:uLnTx/>
-                  <a:uFillTx/>
+                <a:rPr lang="en-US" sz="1200" dirty="0">
                   <a:latin typeface="Corbel" panose="020B0503020204020204" pitchFamily="34" charset="0"/>
-                  <a:ea typeface="+mn-ea"/>
-                  <a:cs typeface="+mn-cs"/>
                 </a:rPr>
                 <a:t>for a traditional data warehouse.</a:t>
               </a:r>
             </a:p>
             <a:p>
-              <a:pPr marL="457200" marR="0" lvl="0" indent="-317500" algn="l" defTabSz="914400" rtl="0" eaLnBrk="1" fontAlgn="auto" latinLnBrk="0" hangingPunct="1">
-                <a:lnSpc>
-                  <a:spcPct val="100000"/>
-                </a:lnSpc>
-                <a:spcBef>
-                  <a:spcPts val="0"/>
-                </a:spcBef>
-                <a:spcAft>
-                  <a:spcPts val="0"/>
-                </a:spcAft>
+              <a:pPr marL="457200" indent="-317500">
                 <a:buClr>
                   <a:srgbClr val="000000"/>
                 </a:buClr>
                 <a:buSzPts val="1400"/>
                 <a:buFont typeface="Arial" panose="020B0604020202020204" pitchFamily="34" charset="0"/>
                 <a:buChar char="•"/>
-                <a:tabLst/>
-                <a:defRPr/>
               </a:pPr>
               <a:r>
-                <a:rPr kumimoji="0" lang="en-US" sz="1300" b="0" i="0" u="none" strike="noStrike" kern="1200" cap="none" spc="0" normalizeH="0" baseline="0" noProof="0" dirty="0">
-                  <a:ln>
-                    <a:noFill/>
-                  </a:ln>
-                  <a:solidFill>
-                    <a:srgbClr val="3B3B3B"/>
-                  </a:solidFill>
-                  <a:effectLst/>
-                  <a:uLnTx/>
-                  <a:uFillTx/>
+                <a:rPr lang="en-US" sz="1200" dirty="0">
                   <a:latin typeface="Corbel" panose="020B0503020204020204" pitchFamily="34" charset="0"/>
-                  <a:ea typeface="+mn-ea"/>
-                  <a:cs typeface="+mn-cs"/>
                 </a:rPr>
                 <a:t>Table and Column-Level access granularity achieved through Lake Formation </a:t>
               </a:r>
               <a:r>
-                <a:rPr kumimoji="0" lang="en-US" sz="1300" b="1" i="1" u="none" strike="noStrike" kern="1200" cap="none" spc="0" normalizeH="0" baseline="0" noProof="0" dirty="0">
-                  <a:ln>
-                    <a:noFill/>
-                  </a:ln>
-                  <a:solidFill>
-                    <a:srgbClr val="3B3B3B"/>
-                  </a:solidFill>
-                  <a:effectLst/>
-                  <a:uLnTx/>
-                  <a:uFillTx/>
+                <a:rPr lang="en-US" sz="1200" b="1" i="1" dirty="0">
                   <a:latin typeface="Corbel" panose="020B0503020204020204" pitchFamily="34" charset="0"/>
-                  <a:ea typeface="+mn-ea"/>
-                  <a:cs typeface="+mn-cs"/>
                 </a:rPr>
                 <a:t>Permissions</a:t>
               </a:r>
               <a:r>
-                <a:rPr kumimoji="0" lang="en-US" sz="1300" b="0" i="0" u="none" strike="noStrike" kern="1200" cap="none" spc="0" normalizeH="0" baseline="0" noProof="0" dirty="0">
-                  <a:ln>
-                    <a:noFill/>
-                  </a:ln>
-                  <a:solidFill>
-                    <a:srgbClr val="3B3B3B"/>
-                  </a:solidFill>
-                  <a:effectLst/>
-                  <a:uLnTx/>
-                  <a:uFillTx/>
+                <a:rPr lang="en-US" sz="1200" dirty="0">
                   <a:latin typeface="Corbel" panose="020B0503020204020204" pitchFamily="34" charset="0"/>
-                  <a:ea typeface="+mn-ea"/>
-                  <a:cs typeface="+mn-cs"/>
                 </a:rPr>
                 <a:t>.</a:t>
               </a:r>
             </a:p>
             <a:p>
-              <a:pPr marL="457200" marR="0" lvl="0" indent="-317500" algn="l" defTabSz="914400" rtl="0" eaLnBrk="1" fontAlgn="auto" latinLnBrk="0" hangingPunct="1">
-                <a:lnSpc>
-                  <a:spcPct val="100000"/>
-                </a:lnSpc>
-                <a:spcBef>
-                  <a:spcPts val="0"/>
-                </a:spcBef>
-                <a:spcAft>
-                  <a:spcPts val="0"/>
-                </a:spcAft>
+              <a:pPr marL="457200" indent="-317500">
                 <a:buClr>
                   <a:srgbClr val="000000"/>
                 </a:buClr>
                 <a:buSzPts val="1400"/>
                 <a:buFont typeface="Arial" panose="020B0604020202020204" pitchFamily="34" charset="0"/>
                 <a:buChar char="•"/>
-                <a:tabLst/>
-                <a:defRPr/>
               </a:pPr>
               <a:r>
-                <a:rPr kumimoji="0" lang="en-US" sz="1300" b="0" i="0" u="none" strike="noStrike" kern="1200" cap="none" spc="0" normalizeH="0" baseline="0" noProof="0" dirty="0">
-                  <a:ln>
-                    <a:noFill/>
-                  </a:ln>
-                  <a:solidFill>
-                    <a:srgbClr val="3B3B3B"/>
-                  </a:solidFill>
-                  <a:effectLst/>
-                  <a:uLnTx/>
-                  <a:uFillTx/>
+                <a:rPr lang="en-US" sz="1200" dirty="0">
                   <a:latin typeface="Corbel" panose="020B0503020204020204" pitchFamily="34" charset="0"/>
-                  <a:ea typeface="+mn-ea"/>
-                  <a:cs typeface="+mn-cs"/>
                 </a:rPr>
                 <a:t>Data Lake Governance enabled through Lake Formation </a:t>
               </a:r>
               <a:r>
-                <a:rPr kumimoji="0" lang="en-US" sz="1300" b="1" i="1" u="none" strike="noStrike" kern="1200" cap="none" spc="0" normalizeH="0" baseline="0" noProof="0" dirty="0">
-                  <a:ln>
-                    <a:noFill/>
-                  </a:ln>
-                  <a:solidFill>
-                    <a:srgbClr val="3B3B3B"/>
-                  </a:solidFill>
-                  <a:effectLst/>
-                  <a:uLnTx/>
-                  <a:uFillTx/>
+                <a:rPr lang="en-US" sz="1200" b="1" i="1" dirty="0">
                   <a:latin typeface="Corbel" panose="020B0503020204020204" pitchFamily="34" charset="0"/>
-                  <a:ea typeface="+mn-ea"/>
-                  <a:cs typeface="+mn-cs"/>
                 </a:rPr>
                 <a:t>Resource Shares.</a:t>
               </a:r>
             </a:p>
             <a:p>
-              <a:pPr marL="457200" marR="0" lvl="0" indent="-317500" algn="l" defTabSz="914400" rtl="0" eaLnBrk="1" fontAlgn="auto" latinLnBrk="0" hangingPunct="1">
-                <a:lnSpc>
-                  <a:spcPct val="100000"/>
-                </a:lnSpc>
-                <a:spcBef>
-                  <a:spcPts val="0"/>
-                </a:spcBef>
-                <a:spcAft>
-                  <a:spcPts val="0"/>
-                </a:spcAft>
+              <a:pPr marL="457200" indent="-317500">
                 <a:buClr>
                   <a:srgbClr val="000000"/>
                 </a:buClr>
                 <a:buSzPts val="1400"/>
                 <a:buFont typeface="Arial" panose="020B0604020202020204" pitchFamily="34" charset="0"/>
                 <a:buChar char="•"/>
-                <a:tabLst/>
-                <a:defRPr/>
               </a:pPr>
               <a:r>
-                <a:rPr kumimoji="0" lang="en-US" sz="1300" b="1" i="1" u="none" strike="noStrike" kern="1200" cap="none" spc="0" normalizeH="0" baseline="0" noProof="0" dirty="0">
-                  <a:ln>
-                    <a:noFill/>
-                  </a:ln>
-                  <a:solidFill>
-                    <a:srgbClr val="3B3B3B"/>
-                  </a:solidFill>
-                  <a:effectLst/>
-                  <a:uLnTx/>
-                  <a:uFillTx/>
+                <a:rPr lang="en-US" sz="1200" b="1" i="1" dirty="0">
                   <a:latin typeface="Corbel" panose="020B0503020204020204" pitchFamily="34" charset="0"/>
-                  <a:ea typeface="+mn-ea"/>
-                  <a:cs typeface="+mn-cs"/>
                 </a:rPr>
                 <a:t>Multi-regional, parameterized, infrastructure-as-code </a:t>
               </a:r>
               <a:r>
-                <a:rPr kumimoji="0" lang="en-US" sz="1300" b="0" i="1" u="none" strike="noStrike" kern="1200" cap="none" spc="0" normalizeH="0" baseline="0" noProof="0" dirty="0">
-                  <a:ln>
-                    <a:noFill/>
-                  </a:ln>
-                  <a:solidFill>
-                    <a:srgbClr val="3B3B3B"/>
-                  </a:solidFill>
-                  <a:effectLst/>
-                  <a:uLnTx/>
-                  <a:uFillTx/>
+                <a:rPr lang="en-US" sz="1200" i="1" dirty="0">
                   <a:latin typeface="Corbel" panose="020B0503020204020204" pitchFamily="34" charset="0"/>
-                  <a:ea typeface="+mn-ea"/>
-                  <a:cs typeface="+mn-cs"/>
                 </a:rPr>
                 <a:t>deployments.</a:t>
               </a:r>
-              <a:endParaRPr kumimoji="0" lang="en-US" sz="1300" b="0" i="0" u="none" strike="noStrike" kern="1200" cap="none" spc="0" normalizeH="0" baseline="0" noProof="0" dirty="0">
-                <a:ln>
-                  <a:noFill/>
-                </a:ln>
-                <a:solidFill>
-                  <a:srgbClr val="3B3B3B"/>
-                </a:solidFill>
-                <a:effectLst/>
-                <a:uLnTx/>
-                <a:uFillTx/>
+              <a:endParaRPr lang="en-US" sz="1200" dirty="0">
                 <a:latin typeface="Corbel" panose="020B0503020204020204" pitchFamily="34" charset="0"/>
-                <a:ea typeface="+mn-ea"/>
-                <a:cs typeface="+mn-cs"/>
               </a:endParaRPr>
             </a:p>
             <a:p>
-              <a:pPr marL="457200" marR="0" lvl="0" indent="-317500" algn="l" defTabSz="914400" rtl="0" eaLnBrk="1" fontAlgn="auto" latinLnBrk="0" hangingPunct="1">
-                <a:lnSpc>
-                  <a:spcPct val="100000"/>
-                </a:lnSpc>
-                <a:spcBef>
-                  <a:spcPts val="0"/>
-                </a:spcBef>
-                <a:spcAft>
-                  <a:spcPts val="0"/>
-                </a:spcAft>
+              <a:pPr marL="457200" indent="-317500">
                 <a:buClr>
                   <a:srgbClr val="000000"/>
                 </a:buClr>
                 <a:buSzPts val="1400"/>
                 <a:buFont typeface="Arial" panose="020B0604020202020204" pitchFamily="34" charset="0"/>
                 <a:buChar char="•"/>
-                <a:tabLst/>
-                <a:defRPr/>
               </a:pPr>
               <a:r>
-                <a:rPr kumimoji="0" lang="en-US" sz="1300" b="0" i="0" u="none" strike="noStrike" kern="1200" cap="none" spc="0" normalizeH="0" baseline="0" noProof="0" dirty="0">
-                  <a:ln>
-                    <a:noFill/>
-                  </a:ln>
-                  <a:solidFill>
-                    <a:srgbClr val="3B3B3B"/>
-                  </a:solidFill>
-                  <a:effectLst/>
-                  <a:uLnTx/>
-                  <a:uFillTx/>
+                <a:rPr lang="en-US" sz="1200" dirty="0">
                   <a:latin typeface="Corbel" panose="020B0503020204020204" pitchFamily="34" charset="0"/>
-                  <a:ea typeface="+mn-ea"/>
-                  <a:cs typeface="+mn-cs"/>
                 </a:rPr>
                 <a:t>Full </a:t>
               </a:r>
               <a:r>
-                <a:rPr kumimoji="0" lang="en-US" sz="1300" b="1" i="1" u="none" strike="noStrike" kern="1200" cap="none" spc="0" normalizeH="0" baseline="0" noProof="0" dirty="0">
-                  <a:ln>
-                    <a:noFill/>
-                  </a:ln>
-                  <a:solidFill>
-                    <a:srgbClr val="3B3B3B"/>
-                  </a:solidFill>
-                  <a:effectLst/>
-                  <a:uLnTx/>
-                  <a:uFillTx/>
+                <a:rPr lang="en-US" sz="1200" b="1" i="1" dirty="0">
                   <a:latin typeface="Corbel" panose="020B0503020204020204" pitchFamily="34" charset="0"/>
-                  <a:ea typeface="+mn-ea"/>
-                  <a:cs typeface="+mn-cs"/>
                 </a:rPr>
                 <a:t>data flow &amp; processing pipeline</a:t>
               </a:r>
               <a:r>
-                <a:rPr kumimoji="0" lang="en-US" sz="1300" b="0" i="1" u="none" strike="noStrike" kern="1200" cap="none" spc="0" normalizeH="0" baseline="0" noProof="0" dirty="0">
-                  <a:ln>
-                    <a:noFill/>
-                  </a:ln>
-                  <a:solidFill>
-                    <a:srgbClr val="3B3B3B"/>
-                  </a:solidFill>
-                  <a:effectLst/>
-                  <a:uLnTx/>
-                  <a:uFillTx/>
+                <a:rPr lang="en-US" sz="1200" i="1" dirty="0">
                   <a:latin typeface="Corbel" panose="020B0503020204020204" pitchFamily="34" charset="0"/>
-                  <a:ea typeface="+mn-ea"/>
-                  <a:cs typeface="+mn-cs"/>
                 </a:rPr>
                 <a:t> </a:t>
               </a:r>
               <a:r>
-                <a:rPr kumimoji="0" lang="en-US" sz="1300" b="0" i="0" u="none" strike="noStrike" kern="1200" cap="none" spc="0" normalizeH="0" baseline="0" noProof="0" dirty="0">
-                  <a:ln>
-                    <a:noFill/>
-                  </a:ln>
-                  <a:solidFill>
-                    <a:srgbClr val="3B3B3B"/>
-                  </a:solidFill>
-                  <a:effectLst/>
-                  <a:uLnTx/>
-                  <a:uFillTx/>
+                <a:rPr lang="en-US" sz="1200" dirty="0">
                   <a:latin typeface="Corbel" panose="020B0503020204020204" pitchFamily="34" charset="0"/>
-                  <a:ea typeface="+mn-ea"/>
-                  <a:cs typeface="+mn-cs"/>
                 </a:rPr>
                 <a:t>with </a:t>
               </a:r>
               <a:r>
-                <a:rPr kumimoji="0" lang="en-US" sz="1300" b="1" i="1" u="none" strike="noStrike" kern="1200" cap="none" spc="0" normalizeH="0" baseline="0" noProof="0" dirty="0">
-                  <a:ln>
-                    <a:noFill/>
-                  </a:ln>
-                  <a:solidFill>
-                    <a:srgbClr val="3B3B3B"/>
-                  </a:solidFill>
-                  <a:effectLst/>
-                  <a:uLnTx/>
-                  <a:uFillTx/>
+                <a:rPr lang="en-US" sz="1200" b="1" i="1" dirty="0">
                   <a:latin typeface="Corbel" panose="020B0503020204020204" pitchFamily="34" charset="0"/>
-                  <a:ea typeface="+mn-ea"/>
-                  <a:cs typeface="+mn-cs"/>
                 </a:rPr>
                 <a:t>Glue Jobs</a:t>
               </a:r>
               <a:r>
-                <a:rPr kumimoji="0" lang="en-US" sz="1300" b="0" i="0" u="none" strike="noStrike" kern="1200" cap="none" spc="0" normalizeH="0" baseline="0" noProof="0" dirty="0">
-                  <a:ln>
-                    <a:noFill/>
-                  </a:ln>
-                  <a:solidFill>
-                    <a:srgbClr val="3B3B3B"/>
-                  </a:solidFill>
-                  <a:effectLst/>
-                  <a:uLnTx/>
-                  <a:uFillTx/>
+                <a:rPr lang="en-US" sz="1200" dirty="0">
                   <a:latin typeface="Corbel" panose="020B0503020204020204" pitchFamily="34" charset="0"/>
-                  <a:ea typeface="+mn-ea"/>
-                  <a:cs typeface="+mn-cs"/>
                 </a:rPr>
                 <a:t>, </a:t>
               </a:r>
               <a:r>
-                <a:rPr kumimoji="0" lang="en-US" sz="1300" b="1" i="1" u="none" strike="noStrike" kern="1200" cap="none" spc="0" normalizeH="0" baseline="0" noProof="0" dirty="0">
-                  <a:ln>
-                    <a:noFill/>
-                  </a:ln>
-                  <a:solidFill>
-                    <a:srgbClr val="3B3B3B"/>
-                  </a:solidFill>
-                  <a:effectLst/>
-                  <a:uLnTx/>
-                  <a:uFillTx/>
+                <a:rPr lang="en-US" sz="1200" b="1" i="1" dirty="0">
                   <a:latin typeface="Corbel" panose="020B0503020204020204" pitchFamily="34" charset="0"/>
-                  <a:ea typeface="+mn-ea"/>
-                  <a:cs typeface="+mn-cs"/>
                 </a:rPr>
                 <a:t>orchestrated</a:t>
               </a:r>
               <a:r>
-                <a:rPr kumimoji="0" lang="en-US" sz="1300" b="0" i="0" u="none" strike="noStrike" kern="1200" cap="none" spc="0" normalizeH="0" baseline="0" noProof="0" dirty="0">
-                  <a:ln>
-                    <a:noFill/>
-                  </a:ln>
-                  <a:solidFill>
-                    <a:srgbClr val="3B3B3B"/>
-                  </a:solidFill>
-                  <a:effectLst/>
-                  <a:uLnTx/>
-                  <a:uFillTx/>
+                <a:rPr lang="en-US" sz="1200" dirty="0">
                   <a:latin typeface="Corbel" panose="020B0503020204020204" pitchFamily="34" charset="0"/>
-                  <a:ea typeface="+mn-ea"/>
-                  <a:cs typeface="+mn-cs"/>
                 </a:rPr>
                 <a:t> by a single </a:t>
               </a:r>
               <a:r>
-                <a:rPr kumimoji="0" lang="en-US" sz="1300" b="1" i="1" u="none" strike="noStrike" kern="1200" cap="none" spc="0" normalizeH="0" baseline="0" noProof="0" dirty="0">
-                  <a:ln>
-                    <a:noFill/>
-                  </a:ln>
-                  <a:solidFill>
-                    <a:srgbClr val="3B3B3B"/>
-                  </a:solidFill>
-                  <a:effectLst/>
-                  <a:uLnTx/>
-                  <a:uFillTx/>
+                <a:rPr lang="en-US" sz="1200" b="1" i="1" dirty="0">
                   <a:latin typeface="Corbel" panose="020B0503020204020204" pitchFamily="34" charset="0"/>
-                  <a:ea typeface="+mn-ea"/>
-                  <a:cs typeface="+mn-cs"/>
                 </a:rPr>
                 <a:t>Step Function</a:t>
               </a:r>
               <a:r>
-                <a:rPr kumimoji="0" lang="en-US" sz="1300" b="0" i="0" u="none" strike="noStrike" kern="1200" cap="none" spc="0" normalizeH="0" baseline="0" noProof="0" dirty="0">
-                  <a:ln>
-                    <a:noFill/>
-                  </a:ln>
-                  <a:solidFill>
-                    <a:srgbClr val="3B3B3B"/>
-                  </a:solidFill>
-                  <a:effectLst/>
-                  <a:uLnTx/>
-                  <a:uFillTx/>
+                <a:rPr lang="en-US" sz="1200" dirty="0">
                   <a:latin typeface="Corbel" panose="020B0503020204020204" pitchFamily="34" charset="0"/>
-                  <a:ea typeface="+mn-ea"/>
-                  <a:cs typeface="+mn-cs"/>
                 </a:rPr>
                 <a:t>.</a:t>
               </a:r>
             </a:p>
             <a:p>
-              <a:pPr marL="457200" marR="0" lvl="0" indent="-317500" algn="l" defTabSz="914400" rtl="0" eaLnBrk="1" fontAlgn="auto" latinLnBrk="0" hangingPunct="1">
-                <a:lnSpc>
-                  <a:spcPct val="100000"/>
-                </a:lnSpc>
-                <a:spcBef>
-                  <a:spcPts val="0"/>
-                </a:spcBef>
-                <a:spcAft>
-                  <a:spcPts val="0"/>
-                </a:spcAft>
+              <a:pPr marL="457200" indent="-317500">
                 <a:buClr>
                   <a:srgbClr val="000000"/>
                 </a:buClr>
                 <a:buSzPts val="1400"/>
                 <a:buFont typeface="Corbel"/>
                 <a:buChar char="●"/>
-                <a:tabLst/>
-                <a:defRPr/>
               </a:pPr>
-              <a:endParaRPr kumimoji="0" lang="en-US" sz="1300" b="0" i="0" u="none" strike="noStrike" kern="1200" cap="none" spc="0" normalizeH="0" baseline="0" noProof="0" dirty="0">
-                <a:ln>
-                  <a:noFill/>
-                </a:ln>
-                <a:solidFill>
-                  <a:srgbClr val="3B3B3B"/>
-                </a:solidFill>
-                <a:effectLst/>
-                <a:uLnTx/>
-                <a:uFillTx/>
+              <a:endParaRPr lang="en-US" sz="1200" dirty="0">
                 <a:latin typeface="Corbel" panose="020B0503020204020204" pitchFamily="34" charset="0"/>
-                <a:ea typeface="+mn-ea"/>
-                <a:cs typeface="+mn-cs"/>
               </a:endParaRPr>
             </a:p>
             <a:p>
@@ -7880,7 +7644,7 @@
                 <a:tabLst/>
                 <a:defRPr/>
               </a:pPr>
-              <a:endParaRPr kumimoji="0" sz="1300" b="1" i="1" u="none" strike="noStrike" kern="0" cap="none" spc="0" normalizeH="0" baseline="0" noProof="0" dirty="0">
+              <a:endParaRPr kumimoji="0" sz="1200" b="1" i="1" u="none" strike="noStrike" kern="0" cap="none" spc="0" normalizeH="0" baseline="0" noProof="0" dirty="0">
                 <a:ln>
                   <a:noFill/>
                 </a:ln>
@@ -7899,547 +7663,10 @@
           </p:txBody>
         </p:sp>
       </p:grpSp>
-      <p:sp>
-        <p:nvSpPr>
-          <p:cNvPr id="20" name="Rectangle: Rounded Corners 19">
-            <a:extLst>
-              <a:ext uri="{FF2B5EF4-FFF2-40B4-BE49-F238E27FC236}">
-                <a16:creationId xmlns:a16="http://schemas.microsoft.com/office/drawing/2014/main" id="{BA5219C4-A334-4340-8DB2-F00E485AC9C7}"/>
-              </a:ext>
-            </a:extLst>
-          </p:cNvPr>
-          <p:cNvSpPr/>
-          <p:nvPr/>
-        </p:nvSpPr>
-        <p:spPr>
-          <a:xfrm>
-            <a:off x="4901069" y="3833459"/>
-            <a:ext cx="1450368" cy="2016680"/>
-          </a:xfrm>
-          <a:prstGeom prst="roundRect">
-            <a:avLst/>
-          </a:prstGeom>
-          <a:noFill/>
-          <a:ln w="12700">
-            <a:solidFill>
-              <a:schemeClr val="bg2">
-                <a:lumMod val="60000"/>
-                <a:lumOff val="40000"/>
-              </a:schemeClr>
-            </a:solidFill>
-            <a:prstDash val="dash"/>
-          </a:ln>
-        </p:spPr>
-        <p:style>
-          <a:lnRef idx="2">
-            <a:schemeClr val="accent1">
-              <a:shade val="50000"/>
-            </a:schemeClr>
-          </a:lnRef>
-          <a:fillRef idx="1">
-            <a:schemeClr val="accent1"/>
-          </a:fillRef>
-          <a:effectRef idx="0">
-            <a:schemeClr val="accent1"/>
-          </a:effectRef>
-          <a:fontRef idx="minor">
-            <a:schemeClr val="lt1"/>
-          </a:fontRef>
-        </p:style>
-        <p:txBody>
-          <a:bodyPr rtlCol="0" anchor="ctr"/>
-          <a:lstStyle/>
-          <a:p>
-            <a:pPr marL="0" marR="0" lvl="0" indent="0" algn="ctr" defTabSz="914400" rtl="0" eaLnBrk="1" fontAlgn="auto" latinLnBrk="0" hangingPunct="1">
-              <a:lnSpc>
-                <a:spcPct val="100000"/>
-              </a:lnSpc>
-              <a:spcBef>
-                <a:spcPts val="0"/>
-              </a:spcBef>
-              <a:spcAft>
-                <a:spcPts val="0"/>
-              </a:spcAft>
-              <a:buClrTx/>
-              <a:buSzTx/>
-              <a:buFontTx/>
-              <a:buNone/>
-              <a:tabLst/>
-              <a:defRPr/>
-            </a:pPr>
-            <a:endParaRPr kumimoji="0" lang="en-US" sz="1800" b="0" i="0" u="none" strike="noStrike" kern="1200" cap="none" spc="0" normalizeH="0" baseline="0" noProof="0">
-              <a:ln>
-                <a:noFill/>
-              </a:ln>
-              <a:solidFill>
-                <a:srgbClr val="FFFFFF"/>
-              </a:solidFill>
-              <a:effectLst/>
-              <a:uLnTx/>
-              <a:uFillTx/>
-              <a:latin typeface="Arial"/>
-              <a:ea typeface="+mn-ea"/>
-              <a:cs typeface="+mn-cs"/>
-            </a:endParaRPr>
-          </a:p>
-        </p:txBody>
-      </p:sp>
-      <p:pic>
-        <p:nvPicPr>
-          <p:cNvPr id="8" name="Picture 7">
-            <a:extLst>
-              <a:ext uri="{FF2B5EF4-FFF2-40B4-BE49-F238E27FC236}">
-                <a16:creationId xmlns:a16="http://schemas.microsoft.com/office/drawing/2014/main" id="{4104A92A-C4DC-4273-9270-47660A6FBF9F}"/>
-              </a:ext>
-            </a:extLst>
-          </p:cNvPr>
-          <p:cNvPicPr>
-            <a:picLocks noChangeAspect="1"/>
-          </p:cNvPicPr>
-          <p:nvPr/>
-        </p:nvPicPr>
-        <p:blipFill>
-          <a:blip r:embed="rId5"/>
-          <a:stretch>
-            <a:fillRect/>
-          </a:stretch>
-        </p:blipFill>
-        <p:spPr>
-          <a:xfrm>
-            <a:off x="7742697" y="761423"/>
-            <a:ext cx="2420628" cy="2718468"/>
-          </a:xfrm>
-          <a:prstGeom prst="rect">
-            <a:avLst/>
-          </a:prstGeom>
-        </p:spPr>
-      </p:pic>
-      <p:pic>
-        <p:nvPicPr>
-          <p:cNvPr id="4" name="Picture 3">
-            <a:extLst>
-              <a:ext uri="{FF2B5EF4-FFF2-40B4-BE49-F238E27FC236}">
-                <a16:creationId xmlns:a16="http://schemas.microsoft.com/office/drawing/2014/main" id="{188DEB35-3B46-413A-BAC2-C746D7127505}"/>
-              </a:ext>
-            </a:extLst>
-          </p:cNvPr>
-          <p:cNvPicPr>
-            <a:picLocks noChangeAspect="1"/>
-          </p:cNvPicPr>
-          <p:nvPr/>
-        </p:nvPicPr>
-        <p:blipFill rotWithShape="1">
-          <a:blip r:embed="rId6"/>
-          <a:srcRect t="1314"/>
-          <a:stretch/>
-        </p:blipFill>
-        <p:spPr>
-          <a:xfrm>
-            <a:off x="152453" y="861628"/>
-            <a:ext cx="7742930" cy="2506377"/>
-          </a:xfrm>
-          <a:prstGeom prst="rect">
-            <a:avLst/>
-          </a:prstGeom>
-        </p:spPr>
-      </p:pic>
-      <p:pic>
-        <p:nvPicPr>
-          <p:cNvPr id="10" name="Picture 9">
-            <a:extLst>
-              <a:ext uri="{FF2B5EF4-FFF2-40B4-BE49-F238E27FC236}">
-                <a16:creationId xmlns:a16="http://schemas.microsoft.com/office/drawing/2014/main" id="{72954FDF-BCA4-43EC-B21D-F2FCDD0900FA}"/>
-              </a:ext>
-            </a:extLst>
-          </p:cNvPr>
-          <p:cNvPicPr>
-            <a:picLocks noChangeAspect="1"/>
-          </p:cNvPicPr>
-          <p:nvPr/>
-        </p:nvPicPr>
-        <p:blipFill>
-          <a:blip r:embed="rId7"/>
-          <a:stretch>
-            <a:fillRect/>
-          </a:stretch>
-        </p:blipFill>
-        <p:spPr>
-          <a:xfrm>
-            <a:off x="8757649" y="940139"/>
-            <a:ext cx="1834316" cy="395592"/>
-          </a:xfrm>
-          <a:prstGeom prst="rect">
-            <a:avLst/>
-          </a:prstGeom>
-        </p:spPr>
-      </p:pic>
-      <p:pic>
-        <p:nvPicPr>
-          <p:cNvPr id="12" name="Picture 11">
-            <a:extLst>
-              <a:ext uri="{FF2B5EF4-FFF2-40B4-BE49-F238E27FC236}">
-                <a16:creationId xmlns:a16="http://schemas.microsoft.com/office/drawing/2014/main" id="{76053BD2-411D-46AB-A587-0EB54B069686}"/>
-              </a:ext>
-            </a:extLst>
-          </p:cNvPr>
-          <p:cNvPicPr>
-            <a:picLocks noChangeAspect="1"/>
-          </p:cNvPicPr>
-          <p:nvPr/>
-        </p:nvPicPr>
-        <p:blipFill>
-          <a:blip r:embed="rId8"/>
-          <a:stretch>
-            <a:fillRect/>
-          </a:stretch>
-        </p:blipFill>
-        <p:spPr>
-          <a:xfrm>
-            <a:off x="10036052" y="2170178"/>
-            <a:ext cx="1024968" cy="475265"/>
-          </a:xfrm>
-          <a:prstGeom prst="rect">
-            <a:avLst/>
-          </a:prstGeom>
-        </p:spPr>
-      </p:pic>
-      <p:pic>
-        <p:nvPicPr>
-          <p:cNvPr id="14" name="Picture 13">
-            <a:extLst>
-              <a:ext uri="{FF2B5EF4-FFF2-40B4-BE49-F238E27FC236}">
-                <a16:creationId xmlns:a16="http://schemas.microsoft.com/office/drawing/2014/main" id="{6AA97F58-D370-4587-A45F-160E8EA03EFD}"/>
-              </a:ext>
-            </a:extLst>
-          </p:cNvPr>
-          <p:cNvPicPr>
-            <a:picLocks noChangeAspect="1"/>
-          </p:cNvPicPr>
-          <p:nvPr/>
-        </p:nvPicPr>
-        <p:blipFill>
-          <a:blip r:embed="rId9"/>
-          <a:stretch>
-            <a:fillRect/>
-          </a:stretch>
-        </p:blipFill>
-        <p:spPr>
-          <a:xfrm>
-            <a:off x="9117453" y="1448393"/>
-            <a:ext cx="2290685" cy="516575"/>
-          </a:xfrm>
-          <a:prstGeom prst="rect">
-            <a:avLst/>
-          </a:prstGeom>
-        </p:spPr>
-      </p:pic>
-      <p:grpSp>
-        <p:nvGrpSpPr>
-          <p:cNvPr id="18" name="Group 17">
-            <a:extLst>
-              <a:ext uri="{FF2B5EF4-FFF2-40B4-BE49-F238E27FC236}">
-                <a16:creationId xmlns:a16="http://schemas.microsoft.com/office/drawing/2014/main" id="{D2F7B548-6C36-415B-9F83-402D3F42342A}"/>
-              </a:ext>
-            </a:extLst>
-          </p:cNvPr>
-          <p:cNvGrpSpPr/>
-          <p:nvPr/>
-        </p:nvGrpSpPr>
-        <p:grpSpPr>
-          <a:xfrm>
-            <a:off x="4955584" y="4195807"/>
-            <a:ext cx="1395853" cy="1455625"/>
-            <a:chOff x="4444181" y="3583188"/>
-            <a:chExt cx="2052752" cy="2140653"/>
-          </a:xfrm>
-        </p:grpSpPr>
-        <p:pic>
-          <p:nvPicPr>
-            <p:cNvPr id="1030" name="Picture 6">
-              <a:extLst>
-                <a:ext uri="{FF2B5EF4-FFF2-40B4-BE49-F238E27FC236}">
-                  <a16:creationId xmlns:a16="http://schemas.microsoft.com/office/drawing/2014/main" id="{B61E7D28-959E-4968-85A5-E7FFC7326263}"/>
-                </a:ext>
-              </a:extLst>
-            </p:cNvPr>
-            <p:cNvPicPr>
-              <a:picLocks noChangeAspect="1" noChangeArrowheads="1"/>
-            </p:cNvPicPr>
-            <p:nvPr/>
-          </p:nvPicPr>
-          <p:blipFill>
-            <a:blip r:embed="rId10">
-              <a:extLst>
-                <a:ext uri="{28A0092B-C50C-407E-A947-70E740481C1C}">
-                  <a14:useLocalDpi xmlns:a14="http://schemas.microsoft.com/office/drawing/2010/main" val="0"/>
-                </a:ext>
-              </a:extLst>
-            </a:blip>
-            <a:srcRect/>
-            <a:stretch>
-              <a:fillRect/>
-            </a:stretch>
-          </p:blipFill>
-          <p:spPr bwMode="auto">
-            <a:xfrm>
-              <a:off x="5018047" y="4111032"/>
-              <a:ext cx="970392" cy="970392"/>
-            </a:xfrm>
-            <a:prstGeom prst="rect">
-              <a:avLst/>
-            </a:prstGeom>
-            <a:noFill/>
-            <a:extLst>
-              <a:ext uri="{909E8E84-426E-40DD-AFC4-6F175D3DCCD1}">
-                <a14:hiddenFill xmlns:a14="http://schemas.microsoft.com/office/drawing/2010/main">
-                  <a:solidFill>
-                    <a:srgbClr val="FFFFFF"/>
-                  </a:solidFill>
-                </a14:hiddenFill>
-              </a:ext>
-            </a:extLst>
-          </p:spPr>
-        </p:pic>
-        <p:pic>
-          <p:nvPicPr>
-            <p:cNvPr id="1026" name="Picture 2">
-              <a:extLst>
-                <a:ext uri="{FF2B5EF4-FFF2-40B4-BE49-F238E27FC236}">
-                  <a16:creationId xmlns:a16="http://schemas.microsoft.com/office/drawing/2014/main" id="{944B1A32-6A30-4E6F-B1F6-544EB1C9091F}"/>
-                </a:ext>
-              </a:extLst>
-            </p:cNvPr>
-            <p:cNvPicPr>
-              <a:picLocks noChangeAspect="1" noChangeArrowheads="1"/>
-            </p:cNvPicPr>
-            <p:nvPr/>
-          </p:nvPicPr>
-          <p:blipFill>
-            <a:blip r:embed="rId11">
-              <a:extLst>
-                <a:ext uri="{28A0092B-C50C-407E-A947-70E740481C1C}">
-                  <a14:useLocalDpi xmlns:a14="http://schemas.microsoft.com/office/drawing/2010/main" val="0"/>
-                </a:ext>
-              </a:extLst>
-            </a:blip>
-            <a:srcRect/>
-            <a:stretch>
-              <a:fillRect/>
-            </a:stretch>
-          </p:blipFill>
-          <p:spPr bwMode="auto">
-            <a:xfrm>
-              <a:off x="5608186" y="3608477"/>
-              <a:ext cx="802143" cy="802143"/>
-            </a:xfrm>
-            <a:prstGeom prst="rect">
-              <a:avLst/>
-            </a:prstGeom>
-            <a:noFill/>
-            <a:extLst>
-              <a:ext uri="{909E8E84-426E-40DD-AFC4-6F175D3DCCD1}">
-                <a14:hiddenFill xmlns:a14="http://schemas.microsoft.com/office/drawing/2010/main">
-                  <a:solidFill>
-                    <a:srgbClr val="FFFFFF"/>
-                  </a:solidFill>
-                </a14:hiddenFill>
-              </a:ext>
-            </a:extLst>
-          </p:spPr>
-        </p:pic>
-        <p:pic>
-          <p:nvPicPr>
-            <p:cNvPr id="1028" name="Picture 4">
-              <a:extLst>
-                <a:ext uri="{FF2B5EF4-FFF2-40B4-BE49-F238E27FC236}">
-                  <a16:creationId xmlns:a16="http://schemas.microsoft.com/office/drawing/2014/main" id="{8DECFC71-1E17-4870-83A2-1FE05FD9499E}"/>
-                </a:ext>
-              </a:extLst>
-            </p:cNvPr>
-            <p:cNvPicPr>
-              <a:picLocks noChangeAspect="1" noChangeArrowheads="1"/>
-            </p:cNvPicPr>
-            <p:nvPr/>
-          </p:nvPicPr>
-          <p:blipFill>
-            <a:blip r:embed="rId12">
-              <a:extLst>
-                <a:ext uri="{28A0092B-C50C-407E-A947-70E740481C1C}">
-                  <a14:useLocalDpi xmlns:a14="http://schemas.microsoft.com/office/drawing/2010/main" val="0"/>
-                </a:ext>
-              </a:extLst>
-            </a:blip>
-            <a:srcRect/>
-            <a:stretch>
-              <a:fillRect/>
-            </a:stretch>
-          </p:blipFill>
-          <p:spPr bwMode="auto">
-            <a:xfrm>
-              <a:off x="5682188" y="4788750"/>
-              <a:ext cx="814745" cy="814745"/>
-            </a:xfrm>
-            <a:prstGeom prst="rect">
-              <a:avLst/>
-            </a:prstGeom>
-            <a:noFill/>
-            <a:extLst>
-              <a:ext uri="{909E8E84-426E-40DD-AFC4-6F175D3DCCD1}">
-                <a14:hiddenFill xmlns:a14="http://schemas.microsoft.com/office/drawing/2010/main">
-                  <a:solidFill>
-                    <a:srgbClr val="FFFFFF"/>
-                  </a:solidFill>
-                </a14:hiddenFill>
-              </a:ext>
-            </a:extLst>
-          </p:spPr>
-        </p:pic>
-        <p:pic>
-          <p:nvPicPr>
-            <p:cNvPr id="1032" name="Picture 8">
-              <a:extLst>
-                <a:ext uri="{FF2B5EF4-FFF2-40B4-BE49-F238E27FC236}">
-                  <a16:creationId xmlns:a16="http://schemas.microsoft.com/office/drawing/2014/main" id="{9513B4A5-D5F8-4A3D-A048-3E03684EE177}"/>
-                </a:ext>
-              </a:extLst>
-            </p:cNvPr>
-            <p:cNvPicPr>
-              <a:picLocks noChangeAspect="1" noChangeArrowheads="1"/>
-            </p:cNvPicPr>
-            <p:nvPr/>
-          </p:nvPicPr>
-          <p:blipFill>
-            <a:blip r:embed="rId13">
-              <a:extLst>
-                <a:ext uri="{28A0092B-C50C-407E-A947-70E740481C1C}">
-                  <a14:useLocalDpi xmlns:a14="http://schemas.microsoft.com/office/drawing/2010/main" val="0"/>
-                </a:ext>
-              </a:extLst>
-            </a:blip>
-            <a:srcRect/>
-            <a:stretch>
-              <a:fillRect/>
-            </a:stretch>
-          </p:blipFill>
-          <p:spPr bwMode="auto">
-            <a:xfrm>
-              <a:off x="4551025" y="3583188"/>
-              <a:ext cx="736846" cy="736846"/>
-            </a:xfrm>
-            <a:prstGeom prst="rect">
-              <a:avLst/>
-            </a:prstGeom>
-            <a:noFill/>
-            <a:extLst>
-              <a:ext uri="{909E8E84-426E-40DD-AFC4-6F175D3DCCD1}">
-                <a14:hiddenFill xmlns:a14="http://schemas.microsoft.com/office/drawing/2010/main">
-                  <a:solidFill>
-                    <a:srgbClr val="FFFFFF"/>
-                  </a:solidFill>
-                </a14:hiddenFill>
-              </a:ext>
-            </a:extLst>
-          </p:spPr>
-        </p:pic>
-        <p:pic>
-          <p:nvPicPr>
-            <p:cNvPr id="1034" name="Picture 10">
-              <a:extLst>
-                <a:ext uri="{FF2B5EF4-FFF2-40B4-BE49-F238E27FC236}">
-                  <a16:creationId xmlns:a16="http://schemas.microsoft.com/office/drawing/2014/main" id="{1D06E028-01B1-4296-8A2A-866E0A2A1FA9}"/>
-                </a:ext>
-              </a:extLst>
-            </p:cNvPr>
-            <p:cNvPicPr>
-              <a:picLocks noChangeAspect="1" noChangeArrowheads="1"/>
-            </p:cNvPicPr>
-            <p:nvPr/>
-          </p:nvPicPr>
-          <p:blipFill>
-            <a:blip r:embed="rId14">
-              <a:extLst>
-                <a:ext uri="{28A0092B-C50C-407E-A947-70E740481C1C}">
-                  <a14:useLocalDpi xmlns:a14="http://schemas.microsoft.com/office/drawing/2010/main" val="0"/>
-                </a:ext>
-              </a:extLst>
-            </a:blip>
-            <a:srcRect/>
-            <a:stretch>
-              <a:fillRect/>
-            </a:stretch>
-          </p:blipFill>
-          <p:spPr bwMode="auto">
-            <a:xfrm>
-              <a:off x="4444181" y="4854237"/>
-              <a:ext cx="817298" cy="869604"/>
-            </a:xfrm>
-            <a:prstGeom prst="rect">
-              <a:avLst/>
-            </a:prstGeom>
-            <a:noFill/>
-            <a:extLst>
-              <a:ext uri="{909E8E84-426E-40DD-AFC4-6F175D3DCCD1}">
-                <a14:hiddenFill xmlns:a14="http://schemas.microsoft.com/office/drawing/2010/main">
-                  <a:solidFill>
-                    <a:srgbClr val="FFFFFF"/>
-                  </a:solidFill>
-                </a14:hiddenFill>
-              </a:ext>
-            </a:extLst>
-          </p:spPr>
-        </p:pic>
-      </p:grpSp>
-      <p:pic>
-        <p:nvPicPr>
-          <p:cNvPr id="1040" name="Picture 16">
-            <a:extLst>
-              <a:ext uri="{FF2B5EF4-FFF2-40B4-BE49-F238E27FC236}">
-                <a16:creationId xmlns:a16="http://schemas.microsoft.com/office/drawing/2014/main" id="{ADD2083C-F893-43DB-AFFC-0342D581F036}"/>
-              </a:ext>
-            </a:extLst>
-          </p:cNvPr>
-          <p:cNvPicPr>
-            <a:picLocks noChangeAspect="1" noChangeArrowheads="1"/>
-          </p:cNvPicPr>
-          <p:nvPr/>
-        </p:nvPicPr>
-        <p:blipFill>
-          <a:blip r:embed="rId15">
-            <a:extLst>
-              <a:ext uri="{28A0092B-C50C-407E-A947-70E740481C1C}">
-                <a14:useLocalDpi xmlns:a14="http://schemas.microsoft.com/office/drawing/2010/main" val="0"/>
-              </a:ext>
-            </a:extLst>
-          </a:blip>
-          <a:srcRect/>
-          <a:stretch>
-            <a:fillRect/>
-          </a:stretch>
-        </p:blipFill>
-        <p:spPr bwMode="auto">
-          <a:xfrm>
-            <a:off x="5024088" y="3515865"/>
-            <a:ext cx="501050" cy="649877"/>
-          </a:xfrm>
-          <a:prstGeom prst="rect">
-            <a:avLst/>
-          </a:prstGeom>
-          <a:noFill/>
-          <a:extLst>
-            <a:ext uri="{909E8E84-426E-40DD-AFC4-6F175D3DCCD1}">
-              <a14:hiddenFill xmlns:a14="http://schemas.microsoft.com/office/drawing/2010/main">
-                <a:solidFill>
-                  <a:srgbClr val="FFFFFF"/>
-                </a:solidFill>
-              </a14:hiddenFill>
-            </a:ext>
-          </a:extLst>
-        </p:spPr>
-      </p:pic>
     </p:spTree>
     <p:extLst>
       <p:ext uri="{BB962C8B-B14F-4D97-AF65-F5344CB8AC3E}">
-        <p14:creationId xmlns:p14="http://schemas.microsoft.com/office/powerpoint/2010/main" val="378388960"/>
+        <p14:creationId xmlns:p14="http://schemas.microsoft.com/office/powerpoint/2010/main" val="3712925337"/>
       </p:ext>
     </p:extLst>
   </p:cSld>

</xml_diff>